<commit_message>
updated lec 31 and tutorials
</commit_message>
<xml_diff>
--- a/Lec-31.pptx
+++ b/Lec-31.pptx
@@ -5,21 +5,22 @@
     <p:sldMasterId id="2147483648" r:id="rId1"/>
   </p:sldMasterIdLst>
   <p:notesMasterIdLst>
-    <p:notesMasterId r:id="rId14"/>
+    <p:notesMasterId r:id="rId15"/>
   </p:notesMasterIdLst>
   <p:sldIdLst>
     <p:sldId id="337" r:id="rId2"/>
-    <p:sldId id="423" r:id="rId3"/>
-    <p:sldId id="425" r:id="rId4"/>
-    <p:sldId id="429" r:id="rId5"/>
-    <p:sldId id="402" r:id="rId6"/>
-    <p:sldId id="424" r:id="rId7"/>
-    <p:sldId id="426" r:id="rId8"/>
-    <p:sldId id="427" r:id="rId9"/>
-    <p:sldId id="428" r:id="rId10"/>
-    <p:sldId id="430" r:id="rId11"/>
-    <p:sldId id="431" r:id="rId12"/>
-    <p:sldId id="432" r:id="rId13"/>
+    <p:sldId id="433" r:id="rId3"/>
+    <p:sldId id="434" r:id="rId4"/>
+    <p:sldId id="423" r:id="rId5"/>
+    <p:sldId id="425" r:id="rId6"/>
+    <p:sldId id="429" r:id="rId7"/>
+    <p:sldId id="424" r:id="rId8"/>
+    <p:sldId id="426" r:id="rId9"/>
+    <p:sldId id="427" r:id="rId10"/>
+    <p:sldId id="428" r:id="rId11"/>
+    <p:sldId id="430" r:id="rId12"/>
+    <p:sldId id="431" r:id="rId13"/>
+    <p:sldId id="432" r:id="rId14"/>
   </p:sldIdLst>
   <p:sldSz cx="9144000" cy="6858000" type="screen4x3"/>
   <p:notesSz cx="6858000" cy="9144000"/>
@@ -301,7 +302,7 @@
               <a:pPr>
                 <a:defRPr/>
               </a:pPr>
-              <a:t>10/30/2025</a:t>
+              <a:t>10/31/2025</a:t>
             </a:fld>
             <a:endParaRPr lang="en-US"/>
           </a:p>
@@ -6625,6 +6626,233 @@
           <p:cNvPr id="3" name="Content Placeholder 2">
             <a:extLst>
               <a:ext uri="{FF2B5EF4-FFF2-40B4-BE49-F238E27FC236}">
+                <a16:creationId xmlns:a16="http://schemas.microsoft.com/office/drawing/2014/main" id="{E093EA72-03C6-495B-9DED-F8BC9DB4D934}"/>
+              </a:ext>
+            </a:extLst>
+          </p:cNvPr>
+          <p:cNvSpPr>
+            <a:spLocks noGrp="1"/>
+          </p:cNvSpPr>
+          <p:nvPr>
+            <p:ph sz="quarter" idx="10"/>
+          </p:nvPr>
+        </p:nvSpPr>
+        <p:spPr/>
+        <p:txBody>
+          <a:bodyPr/>
+          <a:lstStyle/>
+          <a:p>
+            <a:r>
+              <a:rPr lang="en-US" dirty="0"/>
+              <a:t>Transmission gates</a:t>
+            </a:r>
+          </a:p>
+        </p:txBody>
+      </p:sp>
+      <p:pic>
+        <p:nvPicPr>
+          <p:cNvPr id="4" name="Picture 2">
+            <a:extLst>
+              <a:ext uri="{FF2B5EF4-FFF2-40B4-BE49-F238E27FC236}">
+                <a16:creationId xmlns:a16="http://schemas.microsoft.com/office/drawing/2014/main" id="{CE3C1035-5EAC-4AA6-9CBD-1328DA5821D6}"/>
+              </a:ext>
+            </a:extLst>
+          </p:cNvPr>
+          <p:cNvPicPr>
+            <a:picLocks noGrp="1" noChangeAspect="1" noChangeArrowheads="1"/>
+          </p:cNvPicPr>
+          <p:nvPr>
+            <p:ph idx="1"/>
+          </p:nvPr>
+        </p:nvPicPr>
+        <p:blipFill rotWithShape="1">
+          <a:blip r:embed="rId2">
+            <a:extLst>
+              <a:ext uri="{28A0092B-C50C-407E-A947-70E740481C1C}">
+                <a14:useLocalDpi xmlns:a14="http://schemas.microsoft.com/office/drawing/2010/main" val="0"/>
+              </a:ext>
+            </a:extLst>
+          </a:blip>
+          <a:srcRect b="8418"/>
+          <a:stretch/>
+        </p:blipFill>
+        <p:spPr bwMode="auto">
+          <a:xfrm>
+            <a:off x="90142" y="1371600"/>
+            <a:ext cx="6918671" cy="5099813"/>
+          </a:xfrm>
+          <a:prstGeom prst="rect">
+            <a:avLst/>
+          </a:prstGeom>
+          <a:noFill/>
+          <a:extLst>
+            <a:ext uri="{909E8E84-426E-40DD-AFC4-6F175D3DCCD1}">
+              <a14:hiddenFill xmlns:a14="http://schemas.microsoft.com/office/drawing/2010/main">
+                <a:solidFill>
+                  <a:srgbClr val="FFFFFF"/>
+                </a:solidFill>
+              </a14:hiddenFill>
+            </a:ext>
+          </a:extLst>
+        </p:spPr>
+      </p:pic>
+      <p:pic>
+        <p:nvPicPr>
+          <p:cNvPr id="5" name="Picture 2">
+            <a:extLst>
+              <a:ext uri="{FF2B5EF4-FFF2-40B4-BE49-F238E27FC236}">
+                <a16:creationId xmlns:a16="http://schemas.microsoft.com/office/drawing/2014/main" id="{C9EC30F2-6FD5-41B1-95BF-FFEB1AF35A47}"/>
+              </a:ext>
+            </a:extLst>
+          </p:cNvPr>
+          <p:cNvPicPr>
+            <a:picLocks noChangeAspect="1" noChangeArrowheads="1"/>
+          </p:cNvPicPr>
+          <p:nvPr/>
+        </p:nvPicPr>
+        <p:blipFill>
+          <a:blip r:embed="rId3">
+            <a:extLst>
+              <a:ext uri="{28A0092B-C50C-407E-A947-70E740481C1C}">
+                <a14:useLocalDpi xmlns:a14="http://schemas.microsoft.com/office/drawing/2010/main" val="0"/>
+              </a:ext>
+            </a:extLst>
+          </a:blip>
+          <a:srcRect/>
+          <a:stretch>
+            <a:fillRect/>
+          </a:stretch>
+        </p:blipFill>
+        <p:spPr bwMode="auto">
+          <a:xfrm>
+            <a:off x="6274545" y="4583906"/>
+            <a:ext cx="2798363" cy="1804988"/>
+          </a:xfrm>
+          <a:prstGeom prst="rect">
+            <a:avLst/>
+          </a:prstGeom>
+          <a:noFill/>
+          <a:extLst>
+            <a:ext uri="{909E8E84-426E-40DD-AFC4-6F175D3DCCD1}">
+              <a14:hiddenFill xmlns:a14="http://schemas.microsoft.com/office/drawing/2010/main">
+                <a:solidFill>
+                  <a:srgbClr val="FFFFFF"/>
+                </a:solidFill>
+              </a14:hiddenFill>
+            </a:ext>
+          </a:extLst>
+        </p:spPr>
+      </p:pic>
+    </p:spTree>
+    <p:extLst>
+      <p:ext uri="{BB962C8B-B14F-4D97-AF65-F5344CB8AC3E}">
+        <p14:creationId xmlns:p14="http://schemas.microsoft.com/office/powerpoint/2010/main" val="260457647"/>
+      </p:ext>
+    </p:extLst>
+  </p:cSld>
+  <p:clrMapOvr>
+    <a:masterClrMapping/>
+  </p:clrMapOvr>
+  <p:timing>
+    <p:tnLst>
+      <p:par>
+        <p:cTn id="1" dur="indefinite" restart="never" nodeType="tmRoot">
+          <p:childTnLst>
+            <p:seq concurrent="1" nextAc="seek">
+              <p:cTn id="2" dur="indefinite" nodeType="mainSeq">
+                <p:childTnLst>
+                  <p:par>
+                    <p:cTn id="3" fill="hold">
+                      <p:stCondLst>
+                        <p:cond delay="indefinite"/>
+                      </p:stCondLst>
+                      <p:childTnLst>
+                        <p:par>
+                          <p:cTn id="4" fill="hold">
+                            <p:stCondLst>
+                              <p:cond delay="0"/>
+                            </p:stCondLst>
+                            <p:childTnLst>
+                              <p:par>
+                                <p:cTn id="5" presetID="1" presetClass="entr" presetSubtype="0" fill="hold" nodeType="clickEffect">
+                                  <p:stCondLst>
+                                    <p:cond delay="0"/>
+                                  </p:stCondLst>
+                                  <p:childTnLst>
+                                    <p:set>
+                                      <p:cBhvr>
+                                        <p:cTn id="6" dur="1" fill="hold">
+                                          <p:stCondLst>
+                                            <p:cond delay="0"/>
+                                          </p:stCondLst>
+                                        </p:cTn>
+                                        <p:tgtEl>
+                                          <p:spTgt spid="5"/>
+                                        </p:tgtEl>
+                                        <p:attrNameLst>
+                                          <p:attrName>style.visibility</p:attrName>
+                                        </p:attrNameLst>
+                                      </p:cBhvr>
+                                      <p:to>
+                                        <p:strVal val="visible"/>
+                                      </p:to>
+                                    </p:set>
+                                  </p:childTnLst>
+                                </p:cTn>
+                              </p:par>
+                            </p:childTnLst>
+                          </p:cTn>
+                        </p:par>
+                      </p:childTnLst>
+                    </p:cTn>
+                  </p:par>
+                </p:childTnLst>
+              </p:cTn>
+              <p:prevCondLst>
+                <p:cond evt="onPrev" delay="0">
+                  <p:tgtEl>
+                    <p:sldTgt/>
+                  </p:tgtEl>
+                </p:cond>
+              </p:prevCondLst>
+              <p:nextCondLst>
+                <p:cond evt="onNext" delay="0">
+                  <p:tgtEl>
+                    <p:sldTgt/>
+                  </p:tgtEl>
+                </p:cond>
+              </p:nextCondLst>
+            </p:seq>
+          </p:childTnLst>
+        </p:cTn>
+      </p:par>
+    </p:tnLst>
+  </p:timing>
+</p:sld>
+</file>
+
+<file path=ppt/slides/slide11.xml><?xml version="1.0" encoding="utf-8"?>
+<p:sld xmlns:a="http://schemas.openxmlformats.org/drawingml/2006/main" xmlns:r="http://schemas.openxmlformats.org/officeDocument/2006/relationships" xmlns:p="http://schemas.openxmlformats.org/presentationml/2006/main">
+  <p:cSld>
+    <p:spTree>
+      <p:nvGrpSpPr>
+        <p:cNvPr id="1" name=""/>
+        <p:cNvGrpSpPr/>
+        <p:nvPr/>
+      </p:nvGrpSpPr>
+      <p:grpSpPr>
+        <a:xfrm>
+          <a:off x="0" y="0"/>
+          <a:ext cx="0" cy="0"/>
+          <a:chOff x="0" y="0"/>
+          <a:chExt cx="0" cy="0"/>
+        </a:xfrm>
+      </p:grpSpPr>
+      <p:sp>
+        <p:nvSpPr>
+          <p:cNvPr id="3" name="Content Placeholder 2">
+            <a:extLst>
+              <a:ext uri="{FF2B5EF4-FFF2-40B4-BE49-F238E27FC236}">
                 <a16:creationId xmlns:a16="http://schemas.microsoft.com/office/drawing/2014/main" id="{35862F8E-C398-456B-AEAB-F0452DA6A58A}"/>
               </a:ext>
             </a:extLst>
@@ -6924,7 +7152,7 @@
 </p:sld>
 </file>
 
-<file path=ppt/slides/slide11.xml><?xml version="1.0" encoding="utf-8"?>
+<file path=ppt/slides/slide12.xml><?xml version="1.0" encoding="utf-8"?>
 <p:sld xmlns:a="http://schemas.openxmlformats.org/drawingml/2006/main" xmlns:r="http://schemas.openxmlformats.org/officeDocument/2006/relationships" xmlns:p="http://schemas.openxmlformats.org/presentationml/2006/main">
   <p:cSld>
     <p:spTree>
@@ -7143,7 +7371,7 @@
 </p:sld>
 </file>
 
-<file path=ppt/slides/slide12.xml><?xml version="1.0" encoding="utf-8"?>
+<file path=ppt/slides/slide13.xml><?xml version="1.0" encoding="utf-8"?>
 <p:sld xmlns:a="http://schemas.openxmlformats.org/drawingml/2006/main" xmlns:r="http://schemas.openxmlformats.org/officeDocument/2006/relationships" xmlns:p="http://schemas.openxmlformats.org/presentationml/2006/main">
   <p:cSld>
     <p:spTree>
@@ -7349,10 +7577,150 @@
       </p:grpSpPr>
       <p:sp>
         <p:nvSpPr>
+          <p:cNvPr id="2" name="Content Placeholder 1">
+            <a:extLst>
+              <a:ext uri="{FF2B5EF4-FFF2-40B4-BE49-F238E27FC236}">
+                <a16:creationId xmlns:a16="http://schemas.microsoft.com/office/drawing/2014/main" id="{2CF91B43-1ADA-45E1-996A-8E7DA3CF04F3}"/>
+              </a:ext>
+            </a:extLst>
+          </p:cNvPr>
+          <p:cNvSpPr>
+            <a:spLocks noGrp="1"/>
+          </p:cNvSpPr>
+          <p:nvPr>
+            <p:ph idx="1"/>
+          </p:nvPr>
+        </p:nvSpPr>
+        <p:spPr>
+          <a:xfrm>
+            <a:off x="304800" y="1493837"/>
+            <a:ext cx="8534400" cy="4906963"/>
+          </a:xfrm>
+        </p:spPr>
+        <p:txBody>
+          <a:bodyPr/>
+          <a:lstStyle/>
+          <a:p>
+            <a:r>
+              <a:rPr lang="en-US" sz="3200" dirty="0"/>
+              <a:t>Digital Design</a:t>
+            </a:r>
+          </a:p>
+          <a:p>
+            <a:pPr>
+              <a:buFont typeface="Wingdings" panose="05000000000000000000" pitchFamily="2" charset="2"/>
+              <a:buChar char="à"/>
+            </a:pPr>
+            <a:r>
+              <a:rPr lang="en-US" dirty="0">
+                <a:sym typeface="Wingdings" panose="05000000000000000000" pitchFamily="2" charset="2"/>
+              </a:rPr>
+              <a:t>Representing numbers with 1s and 0s (Boolean representations)</a:t>
+            </a:r>
+          </a:p>
+          <a:p>
+            <a:pPr>
+              <a:buFont typeface="Wingdings" panose="05000000000000000000" pitchFamily="2" charset="2"/>
+              <a:buChar char="à"/>
+            </a:pPr>
+            <a:r>
+              <a:rPr lang="en-US" dirty="0">
+                <a:sym typeface="Wingdings" panose="05000000000000000000" pitchFamily="2" charset="2"/>
+              </a:rPr>
+              <a:t>Manipulating Boolean representations (Boolean algebra)</a:t>
+            </a:r>
+          </a:p>
+          <a:p>
+            <a:pPr>
+              <a:buFont typeface="Wingdings" panose="05000000000000000000" pitchFamily="2" charset="2"/>
+              <a:buChar char="à"/>
+            </a:pPr>
+            <a:r>
+              <a:rPr lang="en-US" dirty="0">
+                <a:sym typeface="Wingdings" panose="05000000000000000000" pitchFamily="2" charset="2"/>
+              </a:rPr>
+              <a:t>Ways to simplify expressions</a:t>
+            </a:r>
+          </a:p>
+          <a:p>
+            <a:pPr>
+              <a:buFont typeface="Wingdings" panose="05000000000000000000" pitchFamily="2" charset="2"/>
+              <a:buChar char="à"/>
+            </a:pPr>
+            <a:r>
+              <a:rPr lang="en-US" dirty="0">
+                <a:sym typeface="Wingdings" panose="05000000000000000000" pitchFamily="2" charset="2"/>
+              </a:rPr>
+              <a:t>Implementing with logic gates (combinational logic)</a:t>
+            </a:r>
+          </a:p>
+          <a:p>
+            <a:pPr>
+              <a:buFont typeface="Wingdings" panose="05000000000000000000" pitchFamily="2" charset="2"/>
+              <a:buChar char="à"/>
+            </a:pPr>
+            <a:r>
+              <a:rPr lang="en-US" dirty="0">
+                <a:sym typeface="Wingdings" panose="05000000000000000000" pitchFamily="2" charset="2"/>
+              </a:rPr>
+              <a:t>Adding memory (sequential logic): analysis and synthesis</a:t>
+            </a:r>
+          </a:p>
+          <a:p>
+            <a:pPr>
+              <a:buFont typeface="Wingdings" panose="05000000000000000000" pitchFamily="2" charset="2"/>
+              <a:buChar char="à"/>
+            </a:pPr>
+            <a:endParaRPr lang="en-US" dirty="0">
+              <a:sym typeface="Wingdings" panose="05000000000000000000" pitchFamily="2" charset="2"/>
+            </a:endParaRPr>
+          </a:p>
+          <a:p>
+            <a:pPr>
+              <a:buFont typeface="Wingdings" panose="05000000000000000000" pitchFamily="2" charset="2"/>
+              <a:buChar char="à"/>
+            </a:pPr>
+            <a:r>
+              <a:rPr lang="en-US" dirty="0">
+                <a:sym typeface="Wingdings" panose="05000000000000000000" pitchFamily="2" charset="2"/>
+              </a:rPr>
+              <a:t>How do we build gates?</a:t>
+            </a:r>
+          </a:p>
+          <a:p>
+            <a:pPr lvl="1">
+              <a:buFont typeface="Wingdings" panose="05000000000000000000" pitchFamily="2" charset="2"/>
+              <a:buChar char="à"/>
+            </a:pPr>
+            <a:r>
+              <a:rPr lang="en-US" sz="2000" dirty="0">
+                <a:sym typeface="Wingdings" panose="05000000000000000000" pitchFamily="2" charset="2"/>
+              </a:rPr>
+              <a:t>Transistor-Transistor Logic (TTL): Uses BJTs to build logic gates</a:t>
+            </a:r>
+          </a:p>
+          <a:p>
+            <a:pPr lvl="1">
+              <a:buFont typeface="Wingdings" panose="05000000000000000000" pitchFamily="2" charset="2"/>
+              <a:buChar char="à"/>
+            </a:pPr>
+            <a:r>
+              <a:rPr lang="en-US" sz="2000" dirty="0">
+                <a:solidFill>
+                  <a:srgbClr val="00B050"/>
+                </a:solidFill>
+              </a:rPr>
+              <a:t>MOS based transistors (NMOS, CMOS, Transfer Gates): Today!</a:t>
+            </a:r>
+          </a:p>
+        </p:txBody>
+      </p:sp>
+      <p:sp>
+        <p:nvSpPr>
           <p:cNvPr id="3" name="Content Placeholder 2">
             <a:extLst>
               <a:ext uri="{FF2B5EF4-FFF2-40B4-BE49-F238E27FC236}">
-                <a16:creationId xmlns:a16="http://schemas.microsoft.com/office/drawing/2014/main" id="{10C11615-530D-4854-A751-8D6F426FC6FD}"/>
+                <a16:creationId xmlns:a16="http://schemas.microsoft.com/office/drawing/2014/main" id="{22F99031-FD1E-4B18-9606-1B134D2ECB48}"/>
               </a:ext>
             </a:extLst>
           </p:cNvPr>
@@ -7370,17 +7738,549 @@
           <a:p>
             <a:r>
               <a:rPr lang="en-US" dirty="0"/>
-              <a:t>Metal Oxide Semiconductors</a:t>
+              <a:t>Where we are</a:t>
+            </a:r>
+          </a:p>
+        </p:txBody>
+      </p:sp>
+    </p:spTree>
+    <p:extLst>
+      <p:ext uri="{BB962C8B-B14F-4D97-AF65-F5344CB8AC3E}">
+        <p14:creationId xmlns:p14="http://schemas.microsoft.com/office/powerpoint/2010/main" val="917464461"/>
+      </p:ext>
+    </p:extLst>
+  </p:cSld>
+  <p:clrMapOvr>
+    <a:masterClrMapping/>
+  </p:clrMapOvr>
+  <p:timing>
+    <p:tnLst>
+      <p:par>
+        <p:cTn id="1" dur="indefinite" restart="never" nodeType="tmRoot">
+          <p:childTnLst>
+            <p:seq concurrent="1" nextAc="seek">
+              <p:cTn id="2" dur="indefinite" nodeType="mainSeq">
+                <p:childTnLst>
+                  <p:par>
+                    <p:cTn id="3" fill="hold">
+                      <p:stCondLst>
+                        <p:cond delay="indefinite"/>
+                      </p:stCondLst>
+                      <p:childTnLst>
+                        <p:par>
+                          <p:cTn id="4" fill="hold">
+                            <p:stCondLst>
+                              <p:cond delay="0"/>
+                            </p:stCondLst>
+                            <p:childTnLst>
+                              <p:par>
+                                <p:cTn id="5" presetID="1" presetClass="entr" presetSubtype="0" fill="hold" grpId="0" nodeType="clickEffect">
+                                  <p:stCondLst>
+                                    <p:cond delay="0"/>
+                                  </p:stCondLst>
+                                  <p:childTnLst>
+                                    <p:set>
+                                      <p:cBhvr>
+                                        <p:cTn id="6" dur="1" fill="hold">
+                                          <p:stCondLst>
+                                            <p:cond delay="0"/>
+                                          </p:stCondLst>
+                                        </p:cTn>
+                                        <p:tgtEl>
+                                          <p:spTgt spid="2">
+                                            <p:txEl>
+                                              <p:pRg st="0" end="0"/>
+                                            </p:txEl>
+                                          </p:spTgt>
+                                        </p:tgtEl>
+                                        <p:attrNameLst>
+                                          <p:attrName>style.visibility</p:attrName>
+                                        </p:attrNameLst>
+                                      </p:cBhvr>
+                                      <p:to>
+                                        <p:strVal val="visible"/>
+                                      </p:to>
+                                    </p:set>
+                                  </p:childTnLst>
+                                </p:cTn>
+                              </p:par>
+                            </p:childTnLst>
+                          </p:cTn>
+                        </p:par>
+                      </p:childTnLst>
+                    </p:cTn>
+                  </p:par>
+                  <p:par>
+                    <p:cTn id="7" fill="hold">
+                      <p:stCondLst>
+                        <p:cond delay="indefinite"/>
+                      </p:stCondLst>
+                      <p:childTnLst>
+                        <p:par>
+                          <p:cTn id="8" fill="hold">
+                            <p:stCondLst>
+                              <p:cond delay="0"/>
+                            </p:stCondLst>
+                            <p:childTnLst>
+                              <p:par>
+                                <p:cTn id="9" presetID="1" presetClass="entr" presetSubtype="0" fill="hold" grpId="0" nodeType="clickEffect">
+                                  <p:stCondLst>
+                                    <p:cond delay="0"/>
+                                  </p:stCondLst>
+                                  <p:childTnLst>
+                                    <p:set>
+                                      <p:cBhvr>
+                                        <p:cTn id="10" dur="1" fill="hold">
+                                          <p:stCondLst>
+                                            <p:cond delay="0"/>
+                                          </p:stCondLst>
+                                        </p:cTn>
+                                        <p:tgtEl>
+                                          <p:spTgt spid="2">
+                                            <p:txEl>
+                                              <p:pRg st="1" end="1"/>
+                                            </p:txEl>
+                                          </p:spTgt>
+                                        </p:tgtEl>
+                                        <p:attrNameLst>
+                                          <p:attrName>style.visibility</p:attrName>
+                                        </p:attrNameLst>
+                                      </p:cBhvr>
+                                      <p:to>
+                                        <p:strVal val="visible"/>
+                                      </p:to>
+                                    </p:set>
+                                  </p:childTnLst>
+                                </p:cTn>
+                              </p:par>
+                            </p:childTnLst>
+                          </p:cTn>
+                        </p:par>
+                      </p:childTnLst>
+                    </p:cTn>
+                  </p:par>
+                  <p:par>
+                    <p:cTn id="11" fill="hold">
+                      <p:stCondLst>
+                        <p:cond delay="indefinite"/>
+                      </p:stCondLst>
+                      <p:childTnLst>
+                        <p:par>
+                          <p:cTn id="12" fill="hold">
+                            <p:stCondLst>
+                              <p:cond delay="0"/>
+                            </p:stCondLst>
+                            <p:childTnLst>
+                              <p:par>
+                                <p:cTn id="13" presetID="1" presetClass="entr" presetSubtype="0" fill="hold" grpId="0" nodeType="clickEffect">
+                                  <p:stCondLst>
+                                    <p:cond delay="0"/>
+                                  </p:stCondLst>
+                                  <p:childTnLst>
+                                    <p:set>
+                                      <p:cBhvr>
+                                        <p:cTn id="14" dur="1" fill="hold">
+                                          <p:stCondLst>
+                                            <p:cond delay="0"/>
+                                          </p:stCondLst>
+                                        </p:cTn>
+                                        <p:tgtEl>
+                                          <p:spTgt spid="2">
+                                            <p:txEl>
+                                              <p:pRg st="2" end="2"/>
+                                            </p:txEl>
+                                          </p:spTgt>
+                                        </p:tgtEl>
+                                        <p:attrNameLst>
+                                          <p:attrName>style.visibility</p:attrName>
+                                        </p:attrNameLst>
+                                      </p:cBhvr>
+                                      <p:to>
+                                        <p:strVal val="visible"/>
+                                      </p:to>
+                                    </p:set>
+                                  </p:childTnLst>
+                                </p:cTn>
+                              </p:par>
+                            </p:childTnLst>
+                          </p:cTn>
+                        </p:par>
+                      </p:childTnLst>
+                    </p:cTn>
+                  </p:par>
+                  <p:par>
+                    <p:cTn id="15" fill="hold">
+                      <p:stCondLst>
+                        <p:cond delay="indefinite"/>
+                      </p:stCondLst>
+                      <p:childTnLst>
+                        <p:par>
+                          <p:cTn id="16" fill="hold">
+                            <p:stCondLst>
+                              <p:cond delay="0"/>
+                            </p:stCondLst>
+                            <p:childTnLst>
+                              <p:par>
+                                <p:cTn id="17" presetID="1" presetClass="entr" presetSubtype="0" fill="hold" grpId="0" nodeType="clickEffect">
+                                  <p:stCondLst>
+                                    <p:cond delay="0"/>
+                                  </p:stCondLst>
+                                  <p:childTnLst>
+                                    <p:set>
+                                      <p:cBhvr>
+                                        <p:cTn id="18" dur="1" fill="hold">
+                                          <p:stCondLst>
+                                            <p:cond delay="0"/>
+                                          </p:stCondLst>
+                                        </p:cTn>
+                                        <p:tgtEl>
+                                          <p:spTgt spid="2">
+                                            <p:txEl>
+                                              <p:pRg st="3" end="3"/>
+                                            </p:txEl>
+                                          </p:spTgt>
+                                        </p:tgtEl>
+                                        <p:attrNameLst>
+                                          <p:attrName>style.visibility</p:attrName>
+                                        </p:attrNameLst>
+                                      </p:cBhvr>
+                                      <p:to>
+                                        <p:strVal val="visible"/>
+                                      </p:to>
+                                    </p:set>
+                                  </p:childTnLst>
+                                </p:cTn>
+                              </p:par>
+                            </p:childTnLst>
+                          </p:cTn>
+                        </p:par>
+                      </p:childTnLst>
+                    </p:cTn>
+                  </p:par>
+                  <p:par>
+                    <p:cTn id="19" fill="hold">
+                      <p:stCondLst>
+                        <p:cond delay="indefinite"/>
+                      </p:stCondLst>
+                      <p:childTnLst>
+                        <p:par>
+                          <p:cTn id="20" fill="hold">
+                            <p:stCondLst>
+                              <p:cond delay="0"/>
+                            </p:stCondLst>
+                            <p:childTnLst>
+                              <p:par>
+                                <p:cTn id="21" presetID="1" presetClass="entr" presetSubtype="0" fill="hold" grpId="0" nodeType="clickEffect">
+                                  <p:stCondLst>
+                                    <p:cond delay="0"/>
+                                  </p:stCondLst>
+                                  <p:childTnLst>
+                                    <p:set>
+                                      <p:cBhvr>
+                                        <p:cTn id="22" dur="1" fill="hold">
+                                          <p:stCondLst>
+                                            <p:cond delay="0"/>
+                                          </p:stCondLst>
+                                        </p:cTn>
+                                        <p:tgtEl>
+                                          <p:spTgt spid="2">
+                                            <p:txEl>
+                                              <p:pRg st="4" end="4"/>
+                                            </p:txEl>
+                                          </p:spTgt>
+                                        </p:tgtEl>
+                                        <p:attrNameLst>
+                                          <p:attrName>style.visibility</p:attrName>
+                                        </p:attrNameLst>
+                                      </p:cBhvr>
+                                      <p:to>
+                                        <p:strVal val="visible"/>
+                                      </p:to>
+                                    </p:set>
+                                  </p:childTnLst>
+                                </p:cTn>
+                              </p:par>
+                            </p:childTnLst>
+                          </p:cTn>
+                        </p:par>
+                      </p:childTnLst>
+                    </p:cTn>
+                  </p:par>
+                  <p:par>
+                    <p:cTn id="23" fill="hold">
+                      <p:stCondLst>
+                        <p:cond delay="indefinite"/>
+                      </p:stCondLst>
+                      <p:childTnLst>
+                        <p:par>
+                          <p:cTn id="24" fill="hold">
+                            <p:stCondLst>
+                              <p:cond delay="0"/>
+                            </p:stCondLst>
+                            <p:childTnLst>
+                              <p:par>
+                                <p:cTn id="25" presetID="1" presetClass="entr" presetSubtype="0" fill="hold" grpId="0" nodeType="clickEffect">
+                                  <p:stCondLst>
+                                    <p:cond delay="0"/>
+                                  </p:stCondLst>
+                                  <p:childTnLst>
+                                    <p:set>
+                                      <p:cBhvr>
+                                        <p:cTn id="26" dur="1" fill="hold">
+                                          <p:stCondLst>
+                                            <p:cond delay="0"/>
+                                          </p:stCondLst>
+                                        </p:cTn>
+                                        <p:tgtEl>
+                                          <p:spTgt spid="2">
+                                            <p:txEl>
+                                              <p:pRg st="5" end="5"/>
+                                            </p:txEl>
+                                          </p:spTgt>
+                                        </p:tgtEl>
+                                        <p:attrNameLst>
+                                          <p:attrName>style.visibility</p:attrName>
+                                        </p:attrNameLst>
+                                      </p:cBhvr>
+                                      <p:to>
+                                        <p:strVal val="visible"/>
+                                      </p:to>
+                                    </p:set>
+                                  </p:childTnLst>
+                                </p:cTn>
+                              </p:par>
+                            </p:childTnLst>
+                          </p:cTn>
+                        </p:par>
+                      </p:childTnLst>
+                    </p:cTn>
+                  </p:par>
+                  <p:par>
+                    <p:cTn id="27" fill="hold">
+                      <p:stCondLst>
+                        <p:cond delay="indefinite"/>
+                      </p:stCondLst>
+                      <p:childTnLst>
+                        <p:par>
+                          <p:cTn id="28" fill="hold">
+                            <p:stCondLst>
+                              <p:cond delay="0"/>
+                            </p:stCondLst>
+                            <p:childTnLst>
+                              <p:par>
+                                <p:cTn id="29" presetID="1" presetClass="entr" presetSubtype="0" fill="hold" grpId="0" nodeType="clickEffect">
+                                  <p:stCondLst>
+                                    <p:cond delay="0"/>
+                                  </p:stCondLst>
+                                  <p:childTnLst>
+                                    <p:set>
+                                      <p:cBhvr>
+                                        <p:cTn id="30" dur="1" fill="hold">
+                                          <p:stCondLst>
+                                            <p:cond delay="0"/>
+                                          </p:stCondLst>
+                                        </p:cTn>
+                                        <p:tgtEl>
+                                          <p:spTgt spid="2">
+                                            <p:txEl>
+                                              <p:pRg st="7" end="7"/>
+                                            </p:txEl>
+                                          </p:spTgt>
+                                        </p:tgtEl>
+                                        <p:attrNameLst>
+                                          <p:attrName>style.visibility</p:attrName>
+                                        </p:attrNameLst>
+                                      </p:cBhvr>
+                                      <p:to>
+                                        <p:strVal val="visible"/>
+                                      </p:to>
+                                    </p:set>
+                                  </p:childTnLst>
+                                </p:cTn>
+                              </p:par>
+                            </p:childTnLst>
+                          </p:cTn>
+                        </p:par>
+                      </p:childTnLst>
+                    </p:cTn>
+                  </p:par>
+                  <p:par>
+                    <p:cTn id="31" fill="hold">
+                      <p:stCondLst>
+                        <p:cond delay="indefinite"/>
+                      </p:stCondLst>
+                      <p:childTnLst>
+                        <p:par>
+                          <p:cTn id="32" fill="hold">
+                            <p:stCondLst>
+                              <p:cond delay="0"/>
+                            </p:stCondLst>
+                            <p:childTnLst>
+                              <p:par>
+                                <p:cTn id="33" presetID="1" presetClass="entr" presetSubtype="0" fill="hold" grpId="0" nodeType="clickEffect">
+                                  <p:stCondLst>
+                                    <p:cond delay="0"/>
+                                  </p:stCondLst>
+                                  <p:childTnLst>
+                                    <p:set>
+                                      <p:cBhvr>
+                                        <p:cTn id="34" dur="1" fill="hold">
+                                          <p:stCondLst>
+                                            <p:cond delay="0"/>
+                                          </p:stCondLst>
+                                        </p:cTn>
+                                        <p:tgtEl>
+                                          <p:spTgt spid="2">
+                                            <p:txEl>
+                                              <p:pRg st="8" end="8"/>
+                                            </p:txEl>
+                                          </p:spTgt>
+                                        </p:tgtEl>
+                                        <p:attrNameLst>
+                                          <p:attrName>style.visibility</p:attrName>
+                                        </p:attrNameLst>
+                                      </p:cBhvr>
+                                      <p:to>
+                                        <p:strVal val="visible"/>
+                                      </p:to>
+                                    </p:set>
+                                  </p:childTnLst>
+                                </p:cTn>
+                              </p:par>
+                            </p:childTnLst>
+                          </p:cTn>
+                        </p:par>
+                      </p:childTnLst>
+                    </p:cTn>
+                  </p:par>
+                  <p:par>
+                    <p:cTn id="35" fill="hold">
+                      <p:stCondLst>
+                        <p:cond delay="indefinite"/>
+                      </p:stCondLst>
+                      <p:childTnLst>
+                        <p:par>
+                          <p:cTn id="36" fill="hold">
+                            <p:stCondLst>
+                              <p:cond delay="0"/>
+                            </p:stCondLst>
+                            <p:childTnLst>
+                              <p:par>
+                                <p:cTn id="37" presetID="1" presetClass="entr" presetSubtype="0" fill="hold" grpId="0" nodeType="clickEffect">
+                                  <p:stCondLst>
+                                    <p:cond delay="0"/>
+                                  </p:stCondLst>
+                                  <p:childTnLst>
+                                    <p:set>
+                                      <p:cBhvr>
+                                        <p:cTn id="38" dur="1" fill="hold">
+                                          <p:stCondLst>
+                                            <p:cond delay="0"/>
+                                          </p:stCondLst>
+                                        </p:cTn>
+                                        <p:tgtEl>
+                                          <p:spTgt spid="2">
+                                            <p:txEl>
+                                              <p:pRg st="9" end="9"/>
+                                            </p:txEl>
+                                          </p:spTgt>
+                                        </p:tgtEl>
+                                        <p:attrNameLst>
+                                          <p:attrName>style.visibility</p:attrName>
+                                        </p:attrNameLst>
+                                      </p:cBhvr>
+                                      <p:to>
+                                        <p:strVal val="visible"/>
+                                      </p:to>
+                                    </p:set>
+                                  </p:childTnLst>
+                                </p:cTn>
+                              </p:par>
+                            </p:childTnLst>
+                          </p:cTn>
+                        </p:par>
+                      </p:childTnLst>
+                    </p:cTn>
+                  </p:par>
+                </p:childTnLst>
+              </p:cTn>
+              <p:prevCondLst>
+                <p:cond evt="onPrev" delay="0">
+                  <p:tgtEl>
+                    <p:sldTgt/>
+                  </p:tgtEl>
+                </p:cond>
+              </p:prevCondLst>
+              <p:nextCondLst>
+                <p:cond evt="onNext" delay="0">
+                  <p:tgtEl>
+                    <p:sldTgt/>
+                  </p:tgtEl>
+                </p:cond>
+              </p:nextCondLst>
+            </p:seq>
+          </p:childTnLst>
+        </p:cTn>
+      </p:par>
+    </p:tnLst>
+    <p:bldLst>
+      <p:bldP spid="2" grpId="0" uiExpand="1" build="p"/>
+    </p:bldLst>
+  </p:timing>
+</p:sld>
+</file>
+
+<file path=ppt/slides/slide3.xml><?xml version="1.0" encoding="utf-8"?>
+<p:sld xmlns:a="http://schemas.openxmlformats.org/drawingml/2006/main" xmlns:r="http://schemas.openxmlformats.org/officeDocument/2006/relationships" xmlns:p="http://schemas.openxmlformats.org/presentationml/2006/main">
+  <p:cSld>
+    <p:spTree>
+      <p:nvGrpSpPr>
+        <p:cNvPr id="1" name=""/>
+        <p:cNvGrpSpPr/>
+        <p:nvPr/>
+      </p:nvGrpSpPr>
+      <p:grpSpPr>
+        <a:xfrm>
+          <a:off x="0" y="0"/>
+          <a:ext cx="0" cy="0"/>
+          <a:chOff x="0" y="0"/>
+          <a:chExt cx="0" cy="0"/>
+        </a:xfrm>
+      </p:grpSpPr>
+      <p:sp>
+        <p:nvSpPr>
+          <p:cNvPr id="3" name="Content Placeholder 2">
+            <a:extLst>
+              <a:ext uri="{FF2B5EF4-FFF2-40B4-BE49-F238E27FC236}">
+                <a16:creationId xmlns:a16="http://schemas.microsoft.com/office/drawing/2014/main" id="{EDCEDEAA-EE2F-49EA-8A4F-5647E5CAAABC}"/>
+              </a:ext>
+            </a:extLst>
+          </p:cNvPr>
+          <p:cNvSpPr>
+            <a:spLocks noGrp="1"/>
+          </p:cNvSpPr>
+          <p:nvPr>
+            <p:ph sz="quarter" idx="10"/>
+          </p:nvPr>
+        </p:nvSpPr>
+        <p:spPr/>
+        <p:txBody>
+          <a:bodyPr/>
+          <a:lstStyle/>
+          <a:p>
+            <a:r>
+              <a:rPr lang="en-US" dirty="0"/>
+              <a:t>Metal Oxide Semiconductor Field Effect Transistors (MOSFETs)</a:t>
             </a:r>
           </a:p>
         </p:txBody>
       </p:sp>
       <p:pic>
         <p:nvPicPr>
-          <p:cNvPr id="4" name="Picture 2">
+          <p:cNvPr id="1026" name="Picture 2">
             <a:extLst>
               <a:ext uri="{FF2B5EF4-FFF2-40B4-BE49-F238E27FC236}">
-                <a16:creationId xmlns:a16="http://schemas.microsoft.com/office/drawing/2014/main" id="{396764CC-7F47-44D1-8359-90988DBCBBEA}"/>
+                <a16:creationId xmlns:a16="http://schemas.microsoft.com/office/drawing/2014/main" id="{C4B15632-07AB-4E71-8011-F3E814C047DB}"/>
               </a:ext>
             </a:extLst>
           </p:cNvPr>
@@ -7391,7 +8291,7 @@
             <p:ph idx="1"/>
           </p:nvPr>
         </p:nvPicPr>
-        <p:blipFill>
+        <p:blipFill rotWithShape="1">
           <a:blip r:embed="rId2">
             <a:extLst>
               <a:ext uri="{28A0092B-C50C-407E-A947-70E740481C1C}">
@@ -7399,15 +8299,13 @@
               </a:ext>
             </a:extLst>
           </a:blip>
-          <a:srcRect/>
-          <a:stretch>
-            <a:fillRect/>
-          </a:stretch>
+          <a:srcRect r="50000" b="50509"/>
+          <a:stretch/>
         </p:blipFill>
         <p:spPr bwMode="auto">
           <a:xfrm>
-            <a:off x="2247900" y="1600200"/>
-            <a:ext cx="4648200" cy="2333494"/>
+            <a:off x="671391" y="1493838"/>
+            <a:ext cx="3748209" cy="2239962"/>
           </a:xfrm>
           <a:prstGeom prst="rect">
             <a:avLst/>
@@ -7429,7 +8327,7 @@
           <p:cNvPr id="5" name="Picture 2">
             <a:extLst>
               <a:ext uri="{FF2B5EF4-FFF2-40B4-BE49-F238E27FC236}">
-                <a16:creationId xmlns:a16="http://schemas.microsoft.com/office/drawing/2014/main" id="{88E058CC-98D3-4F16-B8D1-CBC67076EF04}"/>
+                <a16:creationId xmlns:a16="http://schemas.microsoft.com/office/drawing/2014/main" id="{5F0F5484-71C0-4663-9387-A8F94E2CD5F5}"/>
               </a:ext>
             </a:extLst>
           </p:cNvPr>
@@ -7438,23 +8336,465 @@
           </p:cNvPicPr>
           <p:nvPr/>
         </p:nvPicPr>
-        <p:blipFill>
-          <a:blip r:embed="rId3">
+        <p:blipFill rotWithShape="1">
+          <a:blip r:embed="rId2">
             <a:extLst>
               <a:ext uri="{28A0092B-C50C-407E-A947-70E740481C1C}">
                 <a14:useLocalDpi xmlns:a14="http://schemas.microsoft.com/office/drawing/2010/main" val="0"/>
               </a:ext>
             </a:extLst>
           </a:blip>
-          <a:srcRect/>
-          <a:stretch>
-            <a:fillRect/>
-          </a:stretch>
+          <a:srcRect r="192" b="50509"/>
+          <a:stretch/>
         </p:blipFill>
         <p:spPr bwMode="auto">
           <a:xfrm>
-            <a:off x="458787" y="4153693"/>
-            <a:ext cx="8226425" cy="2208213"/>
+            <a:off x="671390" y="1493838"/>
+            <a:ext cx="7482010" cy="2239962"/>
+          </a:xfrm>
+          <a:prstGeom prst="rect">
+            <a:avLst/>
+          </a:prstGeom>
+          <a:noFill/>
+          <a:ln>
+            <a:noFill/>
+          </a:ln>
+          <a:extLst>
+            <a:ext uri="{909E8E84-426E-40DD-AFC4-6F175D3DCCD1}">
+              <a14:hiddenFill xmlns:a14="http://schemas.microsoft.com/office/drawing/2010/main">
+                <a:solidFill>
+                  <a:srgbClr val="FFFFFF"/>
+                </a:solidFill>
+              </a14:hiddenFill>
+            </a:ext>
+            <a:ext uri="{91240B29-F687-4F45-9708-019B960494DF}">
+              <a14:hiddenLine xmlns:a14="http://schemas.microsoft.com/office/drawing/2010/main" w="9525">
+                <a:solidFill>
+                  <a:srgbClr val="000000"/>
+                </a:solidFill>
+                <a:miter lim="800000"/>
+                <a:headEnd/>
+                <a:tailEnd/>
+              </a14:hiddenLine>
+            </a:ext>
+          </a:extLst>
+        </p:spPr>
+      </p:pic>
+      <p:pic>
+        <p:nvPicPr>
+          <p:cNvPr id="6" name="Picture 2">
+            <a:extLst>
+              <a:ext uri="{FF2B5EF4-FFF2-40B4-BE49-F238E27FC236}">
+                <a16:creationId xmlns:a16="http://schemas.microsoft.com/office/drawing/2014/main" id="{4421AC86-978F-4E1B-9DEE-B24B5D9A279A}"/>
+              </a:ext>
+            </a:extLst>
+          </p:cNvPr>
+          <p:cNvPicPr>
+            <a:picLocks noChangeAspect="1" noChangeArrowheads="1"/>
+          </p:cNvPicPr>
+          <p:nvPr/>
+        </p:nvPicPr>
+        <p:blipFill rotWithShape="1">
+          <a:blip r:embed="rId2">
+            <a:extLst>
+              <a:ext uri="{28A0092B-C50C-407E-A947-70E740481C1C}">
+                <a14:useLocalDpi xmlns:a14="http://schemas.microsoft.com/office/drawing/2010/main" val="0"/>
+              </a:ext>
+            </a:extLst>
+          </a:blip>
+          <a:srcRect r="49999"/>
+          <a:stretch/>
+        </p:blipFill>
+        <p:spPr bwMode="auto">
+          <a:xfrm>
+            <a:off x="671389" y="1493838"/>
+            <a:ext cx="3748211" cy="4525962"/>
+          </a:xfrm>
+          <a:prstGeom prst="rect">
+            <a:avLst/>
+          </a:prstGeom>
+          <a:noFill/>
+          <a:ln>
+            <a:noFill/>
+          </a:ln>
+          <a:extLst>
+            <a:ext uri="{909E8E84-426E-40DD-AFC4-6F175D3DCCD1}">
+              <a14:hiddenFill xmlns:a14="http://schemas.microsoft.com/office/drawing/2010/main">
+                <a:solidFill>
+                  <a:srgbClr val="FFFFFF"/>
+                </a:solidFill>
+              </a14:hiddenFill>
+            </a:ext>
+            <a:ext uri="{91240B29-F687-4F45-9708-019B960494DF}">
+              <a14:hiddenLine xmlns:a14="http://schemas.microsoft.com/office/drawing/2010/main" w="9525">
+                <a:solidFill>
+                  <a:srgbClr val="000000"/>
+                </a:solidFill>
+                <a:miter lim="800000"/>
+                <a:headEnd/>
+                <a:tailEnd/>
+              </a14:hiddenLine>
+            </a:ext>
+          </a:extLst>
+        </p:spPr>
+      </p:pic>
+      <p:pic>
+        <p:nvPicPr>
+          <p:cNvPr id="7" name="Picture 2">
+            <a:extLst>
+              <a:ext uri="{FF2B5EF4-FFF2-40B4-BE49-F238E27FC236}">
+                <a16:creationId xmlns:a16="http://schemas.microsoft.com/office/drawing/2014/main" id="{BEA742EC-D2BF-44B8-8631-FA4E572F3AC0}"/>
+              </a:ext>
+            </a:extLst>
+          </p:cNvPr>
+          <p:cNvPicPr>
+            <a:picLocks noChangeAspect="1" noChangeArrowheads="1"/>
+          </p:cNvPicPr>
+          <p:nvPr/>
+        </p:nvPicPr>
+        <p:blipFill rotWithShape="1">
+          <a:blip r:embed="rId2">
+            <a:extLst>
+              <a:ext uri="{28A0092B-C50C-407E-A947-70E740481C1C}">
+                <a14:useLocalDpi xmlns:a14="http://schemas.microsoft.com/office/drawing/2010/main" val="0"/>
+              </a:ext>
+            </a:extLst>
+          </a:blip>
+          <a:srcRect l="1" r="190"/>
+          <a:stretch/>
+        </p:blipFill>
+        <p:spPr bwMode="auto">
+          <a:xfrm>
+            <a:off x="671389" y="1493838"/>
+            <a:ext cx="7482010" cy="4525962"/>
+          </a:xfrm>
+          <a:prstGeom prst="rect">
+            <a:avLst/>
+          </a:prstGeom>
+          <a:noFill/>
+          <a:ln>
+            <a:noFill/>
+          </a:ln>
+          <a:extLst>
+            <a:ext uri="{909E8E84-426E-40DD-AFC4-6F175D3DCCD1}">
+              <a14:hiddenFill xmlns:a14="http://schemas.microsoft.com/office/drawing/2010/main">
+                <a:solidFill>
+                  <a:srgbClr val="FFFFFF"/>
+                </a:solidFill>
+              </a14:hiddenFill>
+            </a:ext>
+            <a:ext uri="{91240B29-F687-4F45-9708-019B960494DF}">
+              <a14:hiddenLine xmlns:a14="http://schemas.microsoft.com/office/drawing/2010/main" w="9525">
+                <a:solidFill>
+                  <a:srgbClr val="000000"/>
+                </a:solidFill>
+                <a:miter lim="800000"/>
+                <a:headEnd/>
+                <a:tailEnd/>
+              </a14:hiddenLine>
+            </a:ext>
+          </a:extLst>
+        </p:spPr>
+      </p:pic>
+    </p:spTree>
+    <p:extLst>
+      <p:ext uri="{BB962C8B-B14F-4D97-AF65-F5344CB8AC3E}">
+        <p14:creationId xmlns:p14="http://schemas.microsoft.com/office/powerpoint/2010/main" val="1600840167"/>
+      </p:ext>
+    </p:extLst>
+  </p:cSld>
+  <p:clrMapOvr>
+    <a:masterClrMapping/>
+  </p:clrMapOvr>
+  <p:timing>
+    <p:tnLst>
+      <p:par>
+        <p:cTn id="1" dur="indefinite" restart="never" nodeType="tmRoot">
+          <p:childTnLst>
+            <p:seq concurrent="1" nextAc="seek">
+              <p:cTn id="2" dur="indefinite" nodeType="mainSeq">
+                <p:childTnLst>
+                  <p:par>
+                    <p:cTn id="3" fill="hold">
+                      <p:stCondLst>
+                        <p:cond delay="indefinite"/>
+                      </p:stCondLst>
+                      <p:childTnLst>
+                        <p:par>
+                          <p:cTn id="4" fill="hold">
+                            <p:stCondLst>
+                              <p:cond delay="0"/>
+                            </p:stCondLst>
+                            <p:childTnLst>
+                              <p:par>
+                                <p:cTn id="5" presetID="1" presetClass="entr" presetSubtype="0" fill="hold" nodeType="clickEffect">
+                                  <p:stCondLst>
+                                    <p:cond delay="0"/>
+                                  </p:stCondLst>
+                                  <p:childTnLst>
+                                    <p:set>
+                                      <p:cBhvr>
+                                        <p:cTn id="6" dur="1" fill="hold">
+                                          <p:stCondLst>
+                                            <p:cond delay="0"/>
+                                          </p:stCondLst>
+                                        </p:cTn>
+                                        <p:tgtEl>
+                                          <p:spTgt spid="1026"/>
+                                        </p:tgtEl>
+                                        <p:attrNameLst>
+                                          <p:attrName>style.visibility</p:attrName>
+                                        </p:attrNameLst>
+                                      </p:cBhvr>
+                                      <p:to>
+                                        <p:strVal val="visible"/>
+                                      </p:to>
+                                    </p:set>
+                                  </p:childTnLst>
+                                </p:cTn>
+                              </p:par>
+                            </p:childTnLst>
+                          </p:cTn>
+                        </p:par>
+                      </p:childTnLst>
+                    </p:cTn>
+                  </p:par>
+                  <p:par>
+                    <p:cTn id="7" fill="hold">
+                      <p:stCondLst>
+                        <p:cond delay="indefinite"/>
+                      </p:stCondLst>
+                      <p:childTnLst>
+                        <p:par>
+                          <p:cTn id="8" fill="hold">
+                            <p:stCondLst>
+                              <p:cond delay="0"/>
+                            </p:stCondLst>
+                            <p:childTnLst>
+                              <p:par>
+                                <p:cTn id="9" presetID="1" presetClass="entr" presetSubtype="0" fill="hold" nodeType="clickEffect">
+                                  <p:stCondLst>
+                                    <p:cond delay="0"/>
+                                  </p:stCondLst>
+                                  <p:childTnLst>
+                                    <p:set>
+                                      <p:cBhvr>
+                                        <p:cTn id="10" dur="1" fill="hold">
+                                          <p:stCondLst>
+                                            <p:cond delay="0"/>
+                                          </p:stCondLst>
+                                        </p:cTn>
+                                        <p:tgtEl>
+                                          <p:spTgt spid="5"/>
+                                        </p:tgtEl>
+                                        <p:attrNameLst>
+                                          <p:attrName>style.visibility</p:attrName>
+                                        </p:attrNameLst>
+                                      </p:cBhvr>
+                                      <p:to>
+                                        <p:strVal val="visible"/>
+                                      </p:to>
+                                    </p:set>
+                                  </p:childTnLst>
+                                </p:cTn>
+                              </p:par>
+                            </p:childTnLst>
+                          </p:cTn>
+                        </p:par>
+                      </p:childTnLst>
+                    </p:cTn>
+                  </p:par>
+                  <p:par>
+                    <p:cTn id="11" fill="hold">
+                      <p:stCondLst>
+                        <p:cond delay="indefinite"/>
+                      </p:stCondLst>
+                      <p:childTnLst>
+                        <p:par>
+                          <p:cTn id="12" fill="hold">
+                            <p:stCondLst>
+                              <p:cond delay="0"/>
+                            </p:stCondLst>
+                            <p:childTnLst>
+                              <p:par>
+                                <p:cTn id="13" presetID="1" presetClass="entr" presetSubtype="0" fill="hold" nodeType="clickEffect">
+                                  <p:stCondLst>
+                                    <p:cond delay="0"/>
+                                  </p:stCondLst>
+                                  <p:childTnLst>
+                                    <p:set>
+                                      <p:cBhvr>
+                                        <p:cTn id="14" dur="1" fill="hold">
+                                          <p:stCondLst>
+                                            <p:cond delay="0"/>
+                                          </p:stCondLst>
+                                        </p:cTn>
+                                        <p:tgtEl>
+                                          <p:spTgt spid="6"/>
+                                        </p:tgtEl>
+                                        <p:attrNameLst>
+                                          <p:attrName>style.visibility</p:attrName>
+                                        </p:attrNameLst>
+                                      </p:cBhvr>
+                                      <p:to>
+                                        <p:strVal val="visible"/>
+                                      </p:to>
+                                    </p:set>
+                                  </p:childTnLst>
+                                </p:cTn>
+                              </p:par>
+                            </p:childTnLst>
+                          </p:cTn>
+                        </p:par>
+                      </p:childTnLst>
+                    </p:cTn>
+                  </p:par>
+                  <p:par>
+                    <p:cTn id="15" fill="hold">
+                      <p:stCondLst>
+                        <p:cond delay="indefinite"/>
+                      </p:stCondLst>
+                      <p:childTnLst>
+                        <p:par>
+                          <p:cTn id="16" fill="hold">
+                            <p:stCondLst>
+                              <p:cond delay="0"/>
+                            </p:stCondLst>
+                            <p:childTnLst>
+                              <p:par>
+                                <p:cTn id="17" presetID="1" presetClass="entr" presetSubtype="0" fill="hold" nodeType="clickEffect">
+                                  <p:stCondLst>
+                                    <p:cond delay="0"/>
+                                  </p:stCondLst>
+                                  <p:childTnLst>
+                                    <p:set>
+                                      <p:cBhvr>
+                                        <p:cTn id="18" dur="1" fill="hold">
+                                          <p:stCondLst>
+                                            <p:cond delay="0"/>
+                                          </p:stCondLst>
+                                        </p:cTn>
+                                        <p:tgtEl>
+                                          <p:spTgt spid="7"/>
+                                        </p:tgtEl>
+                                        <p:attrNameLst>
+                                          <p:attrName>style.visibility</p:attrName>
+                                        </p:attrNameLst>
+                                      </p:cBhvr>
+                                      <p:to>
+                                        <p:strVal val="visible"/>
+                                      </p:to>
+                                    </p:set>
+                                  </p:childTnLst>
+                                </p:cTn>
+                              </p:par>
+                            </p:childTnLst>
+                          </p:cTn>
+                        </p:par>
+                      </p:childTnLst>
+                    </p:cTn>
+                  </p:par>
+                </p:childTnLst>
+              </p:cTn>
+              <p:prevCondLst>
+                <p:cond evt="onPrev" delay="0">
+                  <p:tgtEl>
+                    <p:sldTgt/>
+                  </p:tgtEl>
+                </p:cond>
+              </p:prevCondLst>
+              <p:nextCondLst>
+                <p:cond evt="onNext" delay="0">
+                  <p:tgtEl>
+                    <p:sldTgt/>
+                  </p:tgtEl>
+                </p:cond>
+              </p:nextCondLst>
+            </p:seq>
+          </p:childTnLst>
+        </p:cTn>
+      </p:par>
+    </p:tnLst>
+  </p:timing>
+</p:sld>
+</file>
+
+<file path=ppt/slides/slide4.xml><?xml version="1.0" encoding="utf-8"?>
+<p:sld xmlns:a="http://schemas.openxmlformats.org/drawingml/2006/main" xmlns:r="http://schemas.openxmlformats.org/officeDocument/2006/relationships" xmlns:p="http://schemas.openxmlformats.org/presentationml/2006/main">
+  <p:cSld>
+    <p:spTree>
+      <p:nvGrpSpPr>
+        <p:cNvPr id="1" name=""/>
+        <p:cNvGrpSpPr/>
+        <p:nvPr/>
+      </p:nvGrpSpPr>
+      <p:grpSpPr>
+        <a:xfrm>
+          <a:off x="0" y="0"/>
+          <a:ext cx="0" cy="0"/>
+          <a:chOff x="0" y="0"/>
+          <a:chExt cx="0" cy="0"/>
+        </a:xfrm>
+      </p:grpSpPr>
+      <p:sp>
+        <p:nvSpPr>
+          <p:cNvPr id="3" name="Content Placeholder 2">
+            <a:extLst>
+              <a:ext uri="{FF2B5EF4-FFF2-40B4-BE49-F238E27FC236}">
+                <a16:creationId xmlns:a16="http://schemas.microsoft.com/office/drawing/2014/main" id="{10C11615-530D-4854-A751-8D6F426FC6FD}"/>
+              </a:ext>
+            </a:extLst>
+          </p:cNvPr>
+          <p:cNvSpPr>
+            <a:spLocks noGrp="1"/>
+          </p:cNvSpPr>
+          <p:nvPr>
+            <p:ph sz="quarter" idx="10"/>
+          </p:nvPr>
+        </p:nvSpPr>
+        <p:spPr/>
+        <p:txBody>
+          <a:bodyPr/>
+          <a:lstStyle/>
+          <a:p>
+            <a:r>
+              <a:rPr lang="en-US" dirty="0"/>
+              <a:t>PMOS and NMOS</a:t>
+            </a:r>
+          </a:p>
+        </p:txBody>
+      </p:sp>
+      <p:pic>
+        <p:nvPicPr>
+          <p:cNvPr id="4" name="Picture 2">
+            <a:extLst>
+              <a:ext uri="{FF2B5EF4-FFF2-40B4-BE49-F238E27FC236}">
+                <a16:creationId xmlns:a16="http://schemas.microsoft.com/office/drawing/2014/main" id="{396764CC-7F47-44D1-8359-90988DBCBBEA}"/>
+              </a:ext>
+            </a:extLst>
+          </p:cNvPr>
+          <p:cNvPicPr>
+            <a:picLocks noGrp="1" noChangeAspect="1" noChangeArrowheads="1"/>
+          </p:cNvPicPr>
+          <p:nvPr>
+            <p:ph idx="1"/>
+          </p:nvPr>
+        </p:nvPicPr>
+        <p:blipFill rotWithShape="1">
+          <a:blip r:embed="rId2">
+            <a:extLst>
+              <a:ext uri="{28A0092B-C50C-407E-A947-70E740481C1C}">
+                <a14:useLocalDpi xmlns:a14="http://schemas.microsoft.com/office/drawing/2010/main" val="0"/>
+              </a:ext>
+            </a:extLst>
+          </a:blip>
+          <a:srcRect r="51639" b="11832"/>
+          <a:stretch/>
+        </p:blipFill>
+        <p:spPr bwMode="auto">
+          <a:xfrm>
+            <a:off x="2247900" y="1600200"/>
+            <a:ext cx="2247900" cy="2057400"/>
           </a:xfrm>
           <a:prstGeom prst="rect">
             <a:avLst/>
@@ -7467,6 +8807,109 @@
                   <a:srgbClr val="FFFFFF"/>
                 </a:solidFill>
               </a14:hiddenFill>
+            </a:ext>
+          </a:extLst>
+        </p:spPr>
+      </p:pic>
+      <p:pic>
+        <p:nvPicPr>
+          <p:cNvPr id="5" name="Picture 2">
+            <a:extLst>
+              <a:ext uri="{FF2B5EF4-FFF2-40B4-BE49-F238E27FC236}">
+                <a16:creationId xmlns:a16="http://schemas.microsoft.com/office/drawing/2014/main" id="{88E058CC-98D3-4F16-B8D1-CBC67076EF04}"/>
+              </a:ext>
+            </a:extLst>
+          </p:cNvPr>
+          <p:cNvPicPr>
+            <a:picLocks noChangeAspect="1" noChangeArrowheads="1"/>
+          </p:cNvPicPr>
+          <p:nvPr/>
+        </p:nvPicPr>
+        <p:blipFill rotWithShape="1">
+          <a:blip r:embed="rId3">
+            <a:extLst>
+              <a:ext uri="{28A0092B-C50C-407E-A947-70E740481C1C}">
+                <a14:useLocalDpi xmlns:a14="http://schemas.microsoft.com/office/drawing/2010/main" val="0"/>
+              </a:ext>
+            </a:extLst>
+          </a:blip>
+          <a:srcRect b="12042"/>
+          <a:stretch/>
+        </p:blipFill>
+        <p:spPr bwMode="auto">
+          <a:xfrm>
+            <a:off x="458787" y="4153693"/>
+            <a:ext cx="8226425" cy="1942307"/>
+          </a:xfrm>
+          <a:prstGeom prst="rect">
+            <a:avLst/>
+          </a:prstGeom>
+          <a:noFill/>
+          <a:extLst>
+            <a:ext uri="{909E8E84-426E-40DD-AFC4-6F175D3DCCD1}">
+              <a14:hiddenFill xmlns:a14="http://schemas.microsoft.com/office/drawing/2010/main">
+                <a:solidFill>
+                  <a:srgbClr val="FFFFFF"/>
+                </a:solidFill>
+              </a14:hiddenFill>
+            </a:ext>
+          </a:extLst>
+        </p:spPr>
+      </p:pic>
+      <p:pic>
+        <p:nvPicPr>
+          <p:cNvPr id="6" name="Picture 2">
+            <a:extLst>
+              <a:ext uri="{FF2B5EF4-FFF2-40B4-BE49-F238E27FC236}">
+                <a16:creationId xmlns:a16="http://schemas.microsoft.com/office/drawing/2014/main" id="{E21CF735-64FD-43DD-B1C7-16DC7E9A7F17}"/>
+              </a:ext>
+            </a:extLst>
+          </p:cNvPr>
+          <p:cNvPicPr>
+            <a:picLocks noChangeAspect="1" noChangeArrowheads="1"/>
+          </p:cNvPicPr>
+          <p:nvPr/>
+        </p:nvPicPr>
+        <p:blipFill rotWithShape="1">
+          <a:blip r:embed="rId2">
+            <a:extLst>
+              <a:ext uri="{28A0092B-C50C-407E-A947-70E740481C1C}">
+                <a14:useLocalDpi xmlns:a14="http://schemas.microsoft.com/office/drawing/2010/main" val="0"/>
+              </a:ext>
+            </a:extLst>
+          </a:blip>
+          <a:srcRect l="1" r="-98" b="11832"/>
+          <a:stretch/>
+        </p:blipFill>
+        <p:spPr bwMode="auto">
+          <a:xfrm>
+            <a:off x="2243418" y="1600200"/>
+            <a:ext cx="4652682" cy="2057400"/>
+          </a:xfrm>
+          <a:prstGeom prst="rect">
+            <a:avLst/>
+          </a:prstGeom>
+          <a:noFill/>
+          <a:ln>
+            <a:noFill/>
+          </a:ln>
+          <a:extLst>
+            <a:ext uri="{909E8E84-426E-40DD-AFC4-6F175D3DCCD1}">
+              <a14:hiddenFill xmlns:a14="http://schemas.microsoft.com/office/drawing/2010/main">
+                <a:solidFill>
+                  <a:srgbClr val="FFFFFF"/>
+                </a:solidFill>
+              </a14:hiddenFill>
+            </a:ext>
+            <a:ext uri="{91240B29-F687-4F45-9708-019B960494DF}">
+              <a14:hiddenLine xmlns:a14="http://schemas.microsoft.com/office/drawing/2010/main" w="9525">
+                <a:solidFill>
+                  <a:srgbClr val="000000"/>
+                </a:solidFill>
+                <a:miter lim="800000"/>
+                <a:headEnd/>
+                <a:tailEnd/>
+              </a14:hiddenLine>
             </a:ext>
           </a:extLst>
         </p:spPr>
@@ -7510,6 +8953,51 @@
                                     <p:set>
                                       <p:cBhvr>
                                         <p:cTn id="6" dur="1" fill="hold">
+                                          <p:stCondLst>
+                                            <p:cond delay="0"/>
+                                          </p:stCondLst>
+                                        </p:cTn>
+                                        <p:tgtEl>
+                                          <p:spTgt spid="6"/>
+                                        </p:tgtEl>
+                                        <p:attrNameLst>
+                                          <p:attrName>style.visibility</p:attrName>
+                                        </p:attrNameLst>
+                                      </p:cBhvr>
+                                      <p:to>
+                                        <p:strVal val="visible"/>
+                                      </p:to>
+                                    </p:set>
+                                  </p:childTnLst>
+                                </p:cTn>
+                              </p:par>
+                            </p:childTnLst>
+                          </p:cTn>
+                        </p:par>
+                      </p:childTnLst>
+                    </p:cTn>
+                  </p:par>
+                  <p:par>
+                    <p:cTn id="7" fill="hold">
+                      <p:stCondLst>
+                        <p:cond delay="indefinite"/>
+                      </p:stCondLst>
+                      <p:childTnLst>
+                        <p:par>
+                          <p:cTn id="8" fill="hold">
+                            <p:stCondLst>
+                              <p:cond delay="0"/>
+                            </p:stCondLst>
+                            <p:childTnLst>
+                              <p:par>
+                                <p:cTn id="9" presetID="1" presetClass="entr" presetSubtype="0" fill="hold" nodeType="clickEffect">
+                                  <p:stCondLst>
+                                    <p:cond delay="0"/>
+                                  </p:stCondLst>
+                                  <p:childTnLst>
+                                    <p:set>
+                                      <p:cBhvr>
+                                        <p:cTn id="10" dur="1" fill="hold">
                                           <p:stCondLst>
                                             <p:cond delay="0"/>
                                           </p:stCondLst>
@@ -7559,7 +9047,7 @@
 </p:sld>
 </file>
 
-<file path=ppt/slides/slide3.xml><?xml version="1.0" encoding="utf-8"?>
+<file path=ppt/slides/slide5.xml><?xml version="1.0" encoding="utf-8"?>
 <p:sld xmlns:a="http://schemas.openxmlformats.org/drawingml/2006/main" xmlns:r="http://schemas.openxmlformats.org/officeDocument/2006/relationships" xmlns:p="http://schemas.openxmlformats.org/presentationml/2006/main">
   <p:cSld>
     <p:spTree>
@@ -7736,7 +9224,7 @@
         </p:blipFill>
         <p:spPr bwMode="auto">
           <a:xfrm>
-            <a:off x="1355912" y="1493838"/>
+            <a:off x="1371600" y="1493838"/>
             <a:ext cx="6111688" cy="4297362"/>
           </a:xfrm>
           <a:prstGeom prst="rect">
@@ -7767,6 +9255,107 @@
           </a:extLst>
         </p:spPr>
       </p:pic>
+      <p:sp>
+        <p:nvSpPr>
+          <p:cNvPr id="7" name="TextBox 6">
+            <a:extLst>
+              <a:ext uri="{FF2B5EF4-FFF2-40B4-BE49-F238E27FC236}">
+                <a16:creationId xmlns:a16="http://schemas.microsoft.com/office/drawing/2014/main" id="{2C6BC967-2661-4049-A15F-4A847B9DDC97}"/>
+              </a:ext>
+            </a:extLst>
+          </p:cNvPr>
+          <p:cNvSpPr txBox="1"/>
+          <p:nvPr/>
+        </p:nvSpPr>
+        <p:spPr>
+          <a:xfrm>
+            <a:off x="4434168" y="1600200"/>
+            <a:ext cx="4557432" cy="923330"/>
+          </a:xfrm>
+          <a:prstGeom prst="rect">
+            <a:avLst/>
+          </a:prstGeom>
+          <a:noFill/>
+        </p:spPr>
+        <p:txBody>
+          <a:bodyPr wrap="square">
+            <a:spAutoFit/>
+          </a:bodyPr>
+          <a:lstStyle/>
+          <a:p>
+            <a:r>
+              <a:rPr lang="en-US" dirty="0">
+                <a:solidFill>
+                  <a:srgbClr val="FF0000"/>
+                </a:solidFill>
+                <a:sym typeface="Wingdings" panose="05000000000000000000" pitchFamily="2" charset="2"/>
+              </a:rPr>
+              <a:t>Why does this work when A = 5V?</a:t>
+            </a:r>
+          </a:p>
+          <a:p>
+            <a:endParaRPr lang="en-US" dirty="0">
+              <a:solidFill>
+                <a:srgbClr val="FF0000"/>
+              </a:solidFill>
+              <a:sym typeface="Wingdings" panose="05000000000000000000" pitchFamily="2" charset="2"/>
+            </a:endParaRPr>
+          </a:p>
+          <a:p>
+            <a:r>
+              <a:rPr lang="en-US" dirty="0">
+                <a:solidFill>
+                  <a:schemeClr val="accent1">
+                    <a:lumMod val="75000"/>
+                  </a:schemeClr>
+                </a:solidFill>
+                <a:sym typeface="Wingdings" panose="05000000000000000000" pitchFamily="2" charset="2"/>
+              </a:rPr>
+              <a:t>MOS also has some resistance; R</a:t>
+            </a:r>
+            <a:r>
+              <a:rPr lang="en-US" baseline="-25000" dirty="0">
+                <a:solidFill>
+                  <a:schemeClr val="accent1">
+                    <a:lumMod val="75000"/>
+                  </a:schemeClr>
+                </a:solidFill>
+                <a:sym typeface="Wingdings" panose="05000000000000000000" pitchFamily="2" charset="2"/>
+              </a:rPr>
+              <a:t>1</a:t>
+            </a:r>
+            <a:r>
+              <a:rPr lang="en-US" dirty="0">
+                <a:solidFill>
+                  <a:schemeClr val="accent1">
+                    <a:lumMod val="75000"/>
+                  </a:schemeClr>
+                </a:solidFill>
+                <a:sym typeface="Wingdings" panose="05000000000000000000" pitchFamily="2" charset="2"/>
+              </a:rPr>
+              <a:t>&gt;R</a:t>
+            </a:r>
+            <a:r>
+              <a:rPr lang="en-US" baseline="-25000" dirty="0">
+                <a:solidFill>
+                  <a:schemeClr val="accent1">
+                    <a:lumMod val="75000"/>
+                  </a:schemeClr>
+                </a:solidFill>
+                <a:sym typeface="Wingdings" panose="05000000000000000000" pitchFamily="2" charset="2"/>
+              </a:rPr>
+              <a:t>2</a:t>
+            </a:r>
+            <a:endParaRPr lang="en-US" baseline="-25000" dirty="0">
+              <a:solidFill>
+                <a:schemeClr val="accent1">
+                  <a:lumMod val="75000"/>
+                </a:schemeClr>
+              </a:solidFill>
+            </a:endParaRPr>
+          </a:p>
+        </p:txBody>
+      </p:sp>
     </p:spTree>
     <p:extLst>
       <p:ext uri="{BB962C8B-B14F-4D97-AF65-F5344CB8AC3E}">
@@ -7798,7 +9387,7 @@
                             </p:stCondLst>
                             <p:childTnLst>
                               <p:par>
-                                <p:cTn id="5" presetID="1" presetClass="entr" presetSubtype="0" fill="hold" nodeType="clickEffect">
+                                <p:cTn id="5" presetID="1" presetClass="entr" presetSubtype="0" fill="hold" grpId="0" nodeType="clickEffect">
                                   <p:stCondLst>
                                     <p:cond delay="0"/>
                                   </p:stCondLst>
@@ -7811,7 +9400,11 @@
                                           </p:stCondLst>
                                         </p:cTn>
                                         <p:tgtEl>
-                                          <p:spTgt spid="5"/>
+                                          <p:spTgt spid="7">
+                                            <p:txEl>
+                                              <p:pRg st="0" end="0"/>
+                                            </p:txEl>
+                                          </p:spTgt>
                                         </p:tgtEl>
                                         <p:attrNameLst>
                                           <p:attrName>style.visibility</p:attrName>
@@ -7843,7 +9436,7 @@
                             </p:stCondLst>
                             <p:childTnLst>
                               <p:par>
-                                <p:cTn id="9" presetID="1" presetClass="entr" presetSubtype="0" fill="hold" nodeType="clickEffect">
+                                <p:cTn id="9" presetID="1" presetClass="entr" presetSubtype="0" fill="hold" grpId="0" nodeType="clickEffect">
                                   <p:stCondLst>
                                     <p:cond delay="0"/>
                                   </p:stCondLst>
@@ -7851,6 +9444,100 @@
                                     <p:set>
                                       <p:cBhvr>
                                         <p:cTn id="10" dur="1" fill="hold">
+                                          <p:stCondLst>
+                                            <p:cond delay="0"/>
+                                          </p:stCondLst>
+                                        </p:cTn>
+                                        <p:tgtEl>
+                                          <p:spTgt spid="7">
+                                            <p:txEl>
+                                              <p:pRg st="2" end="2"/>
+                                            </p:txEl>
+                                          </p:spTgt>
+                                        </p:tgtEl>
+                                        <p:attrNameLst>
+                                          <p:attrName>style.visibility</p:attrName>
+                                        </p:attrNameLst>
+                                      </p:cBhvr>
+                                      <p:to>
+                                        <p:strVal val="visible"/>
+                                      </p:to>
+                                    </p:set>
+                                  </p:childTnLst>
+                                </p:cTn>
+                              </p:par>
+                            </p:childTnLst>
+                          </p:cTn>
+                        </p:par>
+                      </p:childTnLst>
+                    </p:cTn>
+                  </p:par>
+                  <p:par>
+                    <p:cTn id="11" fill="hold">
+                      <p:stCondLst>
+                        <p:cond delay="indefinite"/>
+                      </p:stCondLst>
+                      <p:childTnLst>
+                        <p:par>
+                          <p:cTn id="12" fill="hold">
+                            <p:stCondLst>
+                              <p:cond delay="0"/>
+                            </p:stCondLst>
+                            <p:childTnLst>
+                              <p:par>
+                                <p:cTn id="13" presetID="1" presetClass="entr" presetSubtype="0" fill="hold" nodeType="clickEffect">
+                                  <p:stCondLst>
+                                    <p:cond delay="0"/>
+                                  </p:stCondLst>
+                                  <p:childTnLst>
+                                    <p:set>
+                                      <p:cBhvr>
+                                        <p:cTn id="14" dur="1" fill="hold">
+                                          <p:stCondLst>
+                                            <p:cond delay="0"/>
+                                          </p:stCondLst>
+                                        </p:cTn>
+                                        <p:tgtEl>
+                                          <p:spTgt spid="5"/>
+                                        </p:tgtEl>
+                                        <p:attrNameLst>
+                                          <p:attrName>style.visibility</p:attrName>
+                                        </p:attrNameLst>
+                                      </p:cBhvr>
+                                      <p:to>
+                                        <p:strVal val="visible"/>
+                                      </p:to>
+                                    </p:set>
+                                  </p:childTnLst>
+                                </p:cTn>
+                              </p:par>
+                            </p:childTnLst>
+                          </p:cTn>
+                        </p:par>
+                      </p:childTnLst>
+                    </p:cTn>
+                  </p:par>
+                  <p:par>
+                    <p:cTn id="15" fill="hold">
+                      <p:stCondLst>
+                        <p:cond delay="indefinite"/>
+                      </p:stCondLst>
+                      <p:childTnLst>
+                        <p:par>
+                          <p:cTn id="16" fill="hold">
+                            <p:stCondLst>
+                              <p:cond delay="0"/>
+                            </p:stCondLst>
+                            <p:childTnLst>
+                              <p:par>
+                                <p:cTn id="17" presetID="1" presetClass="entr" presetSubtype="0" fill="hold" nodeType="clickEffect">
+                                  <p:stCondLst>
+                                    <p:cond delay="0"/>
+                                  </p:stCondLst>
+                                  <p:childTnLst>
+                                    <p:set>
+                                      <p:cBhvr>
+                                        <p:cTn id="18" dur="1" fill="hold">
                                           <p:stCondLst>
                                             <p:cond delay="0"/>
                                           </p:stCondLst>
@@ -7896,11 +9583,14 @@
         </p:cTn>
       </p:par>
     </p:tnLst>
+    <p:bldLst>
+      <p:bldP spid="7" grpId="0" build="p"/>
+    </p:bldLst>
   </p:timing>
 </p:sld>
 </file>
 
-<file path=ppt/slides/slide4.xml><?xml version="1.0" encoding="utf-8"?>
+<file path=ppt/slides/slide6.xml><?xml version="1.0" encoding="utf-8"?>
 <p:sld xmlns:a="http://schemas.openxmlformats.org/drawingml/2006/main" xmlns:r="http://schemas.openxmlformats.org/officeDocument/2006/relationships" xmlns:p="http://schemas.openxmlformats.org/presentationml/2006/main">
   <p:cSld>
     <p:spTree>
@@ -8908,278 +10598,6 @@
 </p:sld>
 </file>
 
-<file path=ppt/slides/slide5.xml><?xml version="1.0" encoding="utf-8"?>
-<p:sld xmlns:a="http://schemas.openxmlformats.org/drawingml/2006/main" xmlns:r="http://schemas.openxmlformats.org/officeDocument/2006/relationships" xmlns:p="http://schemas.openxmlformats.org/presentationml/2006/main">
-  <p:cSld>
-    <p:spTree>
-      <p:nvGrpSpPr>
-        <p:cNvPr id="1" name=""/>
-        <p:cNvGrpSpPr/>
-        <p:nvPr/>
-      </p:nvGrpSpPr>
-      <p:grpSpPr>
-        <a:xfrm>
-          <a:off x="0" y="0"/>
-          <a:ext cx="0" cy="0"/>
-          <a:chOff x="0" y="0"/>
-          <a:chExt cx="0" cy="0"/>
-        </a:xfrm>
-      </p:grpSpPr>
-      <p:pic>
-        <p:nvPicPr>
-          <p:cNvPr id="5" name="Content Placeholder 4" descr="A qr code on a white background&#10;&#10;AI-generated content may be incorrect.">
-            <a:extLst>
-              <a:ext uri="{FF2B5EF4-FFF2-40B4-BE49-F238E27FC236}">
-                <a16:creationId xmlns:a16="http://schemas.microsoft.com/office/drawing/2014/main" id="{60A1A136-0209-90F1-B1E4-6D0F79EE2659}"/>
-              </a:ext>
-            </a:extLst>
-          </p:cNvPr>
-          <p:cNvPicPr>
-            <a:picLocks noGrp="1" noChangeAspect="1"/>
-          </p:cNvPicPr>
-          <p:nvPr>
-            <p:ph idx="1"/>
-          </p:nvPr>
-        </p:nvPicPr>
-        <p:blipFill>
-          <a:blip r:embed="rId2">
-            <a:extLst>
-              <a:ext uri="{28A0092B-C50C-407E-A947-70E740481C1C}">
-                <a14:useLocalDpi xmlns:a14="http://schemas.microsoft.com/office/drawing/2010/main" val="0"/>
-              </a:ext>
-            </a:extLst>
-          </a:blip>
-          <a:stretch>
-            <a:fillRect/>
-          </a:stretch>
-        </p:blipFill>
-        <p:spPr>
-          <a:xfrm>
-            <a:off x="609600" y="1447800"/>
-            <a:ext cx="5105400" cy="5105400"/>
-          </a:xfrm>
-        </p:spPr>
-      </p:pic>
-      <p:sp>
-        <p:nvSpPr>
-          <p:cNvPr id="3" name="Content Placeholder 2">
-            <a:extLst>
-              <a:ext uri="{FF2B5EF4-FFF2-40B4-BE49-F238E27FC236}">
-                <a16:creationId xmlns:a16="http://schemas.microsoft.com/office/drawing/2014/main" id="{794439D3-5825-E989-96F9-EF0D6E48C418}"/>
-              </a:ext>
-            </a:extLst>
-          </p:cNvPr>
-          <p:cNvSpPr>
-            <a:spLocks noGrp="1"/>
-          </p:cNvSpPr>
-          <p:nvPr>
-            <p:ph sz="quarter" idx="10"/>
-          </p:nvPr>
-        </p:nvSpPr>
-        <p:spPr/>
-        <p:txBody>
-          <a:bodyPr/>
-          <a:lstStyle/>
-          <a:p>
-            <a:r>
-              <a:rPr lang="en-US" dirty="0"/>
-              <a:t>Attendance!</a:t>
-            </a:r>
-            <a:endParaRPr lang="en-IN" dirty="0"/>
-          </a:p>
-        </p:txBody>
-      </p:sp>
-      <p:sp>
-        <p:nvSpPr>
-          <p:cNvPr id="7" name="TextBox 6">
-            <a:extLst>
-              <a:ext uri="{FF2B5EF4-FFF2-40B4-BE49-F238E27FC236}">
-                <a16:creationId xmlns:a16="http://schemas.microsoft.com/office/drawing/2014/main" id="{5DC6D221-3557-4B26-23D4-4BAF1442A190}"/>
-              </a:ext>
-            </a:extLst>
-          </p:cNvPr>
-          <p:cNvSpPr txBox="1"/>
-          <p:nvPr/>
-        </p:nvSpPr>
-        <p:spPr>
-          <a:xfrm>
-            <a:off x="5486400" y="1905000"/>
-            <a:ext cx="3352800" cy="3416320"/>
-          </a:xfrm>
-          <a:prstGeom prst="rect">
-            <a:avLst/>
-          </a:prstGeom>
-          <a:noFill/>
-        </p:spPr>
-        <p:txBody>
-          <a:bodyPr wrap="square">
-            <a:spAutoFit/>
-          </a:bodyPr>
-          <a:lstStyle/>
-          <a:p>
-            <a:r>
-              <a:rPr lang="en-IN" dirty="0"/>
-              <a:t>Will be opened only during the attendance window.</a:t>
-            </a:r>
-          </a:p>
-          <a:p>
-            <a:endParaRPr lang="en-IN" dirty="0"/>
-          </a:p>
-          <a:p>
-            <a:r>
-              <a:rPr lang="en-IN" dirty="0"/>
-              <a:t>Enable location on your device.</a:t>
-            </a:r>
-          </a:p>
-          <a:p>
-            <a:endParaRPr lang="en-IN" dirty="0"/>
-          </a:p>
-          <a:p>
-            <a:r>
-              <a:rPr lang="en-IN" dirty="0"/>
-              <a:t>Grant any location permissions requested by the website.</a:t>
-            </a:r>
-          </a:p>
-          <a:p>
-            <a:endParaRPr lang="en-IN" dirty="0"/>
-          </a:p>
-          <a:p>
-            <a:r>
-              <a:rPr lang="en-IN" dirty="0"/>
-              <a:t>Refresh the page.</a:t>
-            </a:r>
-          </a:p>
-          <a:p>
-            <a:endParaRPr lang="en-IN" dirty="0"/>
-          </a:p>
-          <a:p>
-            <a:r>
-              <a:rPr lang="en-IN" dirty="0"/>
-              <a:t>Try submitting again.</a:t>
-            </a:r>
-          </a:p>
-        </p:txBody>
-      </p:sp>
-    </p:spTree>
-    <p:extLst>
-      <p:ext uri="{BB962C8B-B14F-4D97-AF65-F5344CB8AC3E}">
-        <p14:creationId xmlns:p14="http://schemas.microsoft.com/office/powerpoint/2010/main" val="242540135"/>
-      </p:ext>
-    </p:extLst>
-  </p:cSld>
-  <p:clrMapOvr>
-    <a:masterClrMapping/>
-  </p:clrMapOvr>
-</p:sld>
-</file>
-
-<file path=ppt/slides/slide6.xml><?xml version="1.0" encoding="utf-8"?>
-<p:sld xmlns:a="http://schemas.openxmlformats.org/drawingml/2006/main" xmlns:r="http://schemas.openxmlformats.org/officeDocument/2006/relationships" xmlns:p="http://schemas.openxmlformats.org/presentationml/2006/main">
-  <p:cSld>
-    <p:spTree>
-      <p:nvGrpSpPr>
-        <p:cNvPr id="1" name=""/>
-        <p:cNvGrpSpPr/>
-        <p:nvPr/>
-      </p:nvGrpSpPr>
-      <p:grpSpPr>
-        <a:xfrm>
-          <a:off x="0" y="0"/>
-          <a:ext cx="0" cy="0"/>
-          <a:chOff x="0" y="0"/>
-          <a:chExt cx="0" cy="0"/>
-        </a:xfrm>
-      </p:grpSpPr>
-      <p:sp>
-        <p:nvSpPr>
-          <p:cNvPr id="3" name="Content Placeholder 2">
-            <a:extLst>
-              <a:ext uri="{FF2B5EF4-FFF2-40B4-BE49-F238E27FC236}">
-                <a16:creationId xmlns:a16="http://schemas.microsoft.com/office/drawing/2014/main" id="{62997713-01B1-4DE1-AC29-C3C7B2DF05C6}"/>
-              </a:ext>
-            </a:extLst>
-          </p:cNvPr>
-          <p:cNvSpPr>
-            <a:spLocks noGrp="1"/>
-          </p:cNvSpPr>
-          <p:nvPr>
-            <p:ph sz="quarter" idx="10"/>
-          </p:nvPr>
-        </p:nvSpPr>
-        <p:spPr/>
-        <p:txBody>
-          <a:bodyPr/>
-          <a:lstStyle/>
-          <a:p>
-            <a:r>
-              <a:rPr lang="en-US" dirty="0"/>
-              <a:t>Complementary MOS (CMOS)</a:t>
-            </a:r>
-          </a:p>
-        </p:txBody>
-      </p:sp>
-      <p:pic>
-        <p:nvPicPr>
-          <p:cNvPr id="1026" name="Picture 2" descr="What is a CMOS Logic IC? | Toshiba Electronic Devices &amp; Storage Corporation  | Asia-English">
-            <a:extLst>
-              <a:ext uri="{FF2B5EF4-FFF2-40B4-BE49-F238E27FC236}">
-                <a16:creationId xmlns:a16="http://schemas.microsoft.com/office/drawing/2014/main" id="{CA6DE6CF-1F67-414D-95F6-048A5DBAACCE}"/>
-              </a:ext>
-            </a:extLst>
-          </p:cNvPr>
-          <p:cNvPicPr>
-            <a:picLocks noGrp="1" noChangeAspect="1" noChangeArrowheads="1"/>
-          </p:cNvPicPr>
-          <p:nvPr>
-            <p:ph idx="1"/>
-          </p:nvPr>
-        </p:nvPicPr>
-        <p:blipFill>
-          <a:blip r:embed="rId2">
-            <a:extLst>
-              <a:ext uri="{28A0092B-C50C-407E-A947-70E740481C1C}">
-                <a14:useLocalDpi xmlns:a14="http://schemas.microsoft.com/office/drawing/2010/main" val="0"/>
-              </a:ext>
-            </a:extLst>
-          </a:blip>
-          <a:srcRect/>
-          <a:stretch>
-            <a:fillRect/>
-          </a:stretch>
-        </p:blipFill>
-        <p:spPr bwMode="auto">
-          <a:xfrm>
-            <a:off x="449870" y="1645467"/>
-            <a:ext cx="7939459" cy="4222703"/>
-          </a:xfrm>
-          <a:prstGeom prst="rect">
-            <a:avLst/>
-          </a:prstGeom>
-          <a:noFill/>
-          <a:extLst>
-            <a:ext uri="{909E8E84-426E-40DD-AFC4-6F175D3DCCD1}">
-              <a14:hiddenFill xmlns:a14="http://schemas.microsoft.com/office/drawing/2010/main">
-                <a:solidFill>
-                  <a:srgbClr val="FFFFFF"/>
-                </a:solidFill>
-              </a14:hiddenFill>
-            </a:ext>
-          </a:extLst>
-        </p:spPr>
-      </p:pic>
-    </p:spTree>
-    <p:extLst>
-      <p:ext uri="{BB962C8B-B14F-4D97-AF65-F5344CB8AC3E}">
-        <p14:creationId xmlns:p14="http://schemas.microsoft.com/office/powerpoint/2010/main" val="3538801147"/>
-      </p:ext>
-    </p:extLst>
-  </p:cSld>
-  <p:clrMapOvr>
-    <a:masterClrMapping/>
-  </p:clrMapOvr>
-</p:sld>
-</file>
-
 <file path=ppt/slides/slide7.xml><?xml version="1.0" encoding="utf-8"?>
 <p:sld xmlns:a="http://schemas.openxmlformats.org/drawingml/2006/main" xmlns:r="http://schemas.openxmlformats.org/officeDocument/2006/relationships" xmlns:p="http://schemas.openxmlformats.org/presentationml/2006/main">
   <p:cSld>
@@ -9202,6 +10620,113 @@
           <p:cNvPr id="3" name="Content Placeholder 2">
             <a:extLst>
               <a:ext uri="{FF2B5EF4-FFF2-40B4-BE49-F238E27FC236}">
+                <a16:creationId xmlns:a16="http://schemas.microsoft.com/office/drawing/2014/main" id="{62997713-01B1-4DE1-AC29-C3C7B2DF05C6}"/>
+              </a:ext>
+            </a:extLst>
+          </p:cNvPr>
+          <p:cNvSpPr>
+            <a:spLocks noGrp="1"/>
+          </p:cNvSpPr>
+          <p:nvPr>
+            <p:ph sz="quarter" idx="10"/>
+          </p:nvPr>
+        </p:nvSpPr>
+        <p:spPr/>
+        <p:txBody>
+          <a:bodyPr/>
+          <a:lstStyle/>
+          <a:p>
+            <a:r>
+              <a:rPr lang="en-US" dirty="0"/>
+              <a:t>Complementary MOS (CMOS)</a:t>
+            </a:r>
+          </a:p>
+        </p:txBody>
+      </p:sp>
+      <p:pic>
+        <p:nvPicPr>
+          <p:cNvPr id="1026" name="Picture 2" descr="What is a CMOS Logic IC? | Toshiba Electronic Devices &amp; Storage Corporation  | Asia-English">
+            <a:extLst>
+              <a:ext uri="{FF2B5EF4-FFF2-40B4-BE49-F238E27FC236}">
+                <a16:creationId xmlns:a16="http://schemas.microsoft.com/office/drawing/2014/main" id="{CA6DE6CF-1F67-414D-95F6-048A5DBAACCE}"/>
+              </a:ext>
+            </a:extLst>
+          </p:cNvPr>
+          <p:cNvPicPr>
+            <a:picLocks noGrp="1" noChangeAspect="1" noChangeArrowheads="1"/>
+          </p:cNvPicPr>
+          <p:nvPr>
+            <p:ph idx="1"/>
+          </p:nvPr>
+        </p:nvPicPr>
+        <p:blipFill>
+          <a:blip r:embed="rId2">
+            <a:extLst>
+              <a:ext uri="{28A0092B-C50C-407E-A947-70E740481C1C}">
+                <a14:useLocalDpi xmlns:a14="http://schemas.microsoft.com/office/drawing/2010/main" val="0"/>
+              </a:ext>
+            </a:extLst>
+          </a:blip>
+          <a:srcRect/>
+          <a:stretch>
+            <a:fillRect/>
+          </a:stretch>
+        </p:blipFill>
+        <p:spPr bwMode="auto">
+          <a:xfrm>
+            <a:off x="449870" y="1645467"/>
+            <a:ext cx="7939459" cy="4222703"/>
+          </a:xfrm>
+          <a:prstGeom prst="rect">
+            <a:avLst/>
+          </a:prstGeom>
+          <a:noFill/>
+          <a:extLst>
+            <a:ext uri="{909E8E84-426E-40DD-AFC4-6F175D3DCCD1}">
+              <a14:hiddenFill xmlns:a14="http://schemas.microsoft.com/office/drawing/2010/main">
+                <a:solidFill>
+                  <a:srgbClr val="FFFFFF"/>
+                </a:solidFill>
+              </a14:hiddenFill>
+            </a:ext>
+          </a:extLst>
+        </p:spPr>
+      </p:pic>
+    </p:spTree>
+    <p:extLst>
+      <p:ext uri="{BB962C8B-B14F-4D97-AF65-F5344CB8AC3E}">
+        <p14:creationId xmlns:p14="http://schemas.microsoft.com/office/powerpoint/2010/main" val="3538801147"/>
+      </p:ext>
+    </p:extLst>
+  </p:cSld>
+  <p:clrMapOvr>
+    <a:masterClrMapping/>
+  </p:clrMapOvr>
+</p:sld>
+</file>
+
+<file path=ppt/slides/slide8.xml><?xml version="1.0" encoding="utf-8"?>
+<p:sld xmlns:a="http://schemas.openxmlformats.org/drawingml/2006/main" xmlns:r="http://schemas.openxmlformats.org/officeDocument/2006/relationships" xmlns:p="http://schemas.openxmlformats.org/presentationml/2006/main">
+  <p:cSld>
+    <p:spTree>
+      <p:nvGrpSpPr>
+        <p:cNvPr id="1" name=""/>
+        <p:cNvGrpSpPr/>
+        <p:nvPr/>
+      </p:nvGrpSpPr>
+      <p:grpSpPr>
+        <a:xfrm>
+          <a:off x="0" y="0"/>
+          <a:ext cx="0" cy="0"/>
+          <a:chOff x="0" y="0"/>
+          <a:chExt cx="0" cy="0"/>
+        </a:xfrm>
+      </p:grpSpPr>
+      <p:sp>
+        <p:nvSpPr>
+          <p:cNvPr id="3" name="Content Placeholder 2">
+            <a:extLst>
+              <a:ext uri="{FF2B5EF4-FFF2-40B4-BE49-F238E27FC236}">
                 <a16:creationId xmlns:a16="http://schemas.microsoft.com/office/drawing/2014/main" id="{14186ED5-B77A-4949-9FDA-2D5A1F0A723B}"/>
               </a:ext>
             </a:extLst>
@@ -9287,7 +10812,7 @@
 </p:sld>
 </file>
 
-<file path=ppt/slides/slide8.xml><?xml version="1.0" encoding="utf-8"?>
+<file path=ppt/slides/slide9.xml><?xml version="1.0" encoding="utf-8"?>
 <p:sld xmlns:a="http://schemas.openxmlformats.org/drawingml/2006/main" xmlns:r="http://schemas.openxmlformats.org/officeDocument/2006/relationships" xmlns:p="http://schemas.openxmlformats.org/presentationml/2006/main">
   <p:cSld>
     <p:spTree>
@@ -9585,233 +11110,6 @@
                                         </p:cTn>
                                         <p:tgtEl>
                                           <p:spTgt spid="6"/>
-                                        </p:tgtEl>
-                                        <p:attrNameLst>
-                                          <p:attrName>style.visibility</p:attrName>
-                                        </p:attrNameLst>
-                                      </p:cBhvr>
-                                      <p:to>
-                                        <p:strVal val="visible"/>
-                                      </p:to>
-                                    </p:set>
-                                  </p:childTnLst>
-                                </p:cTn>
-                              </p:par>
-                            </p:childTnLst>
-                          </p:cTn>
-                        </p:par>
-                      </p:childTnLst>
-                    </p:cTn>
-                  </p:par>
-                </p:childTnLst>
-              </p:cTn>
-              <p:prevCondLst>
-                <p:cond evt="onPrev" delay="0">
-                  <p:tgtEl>
-                    <p:sldTgt/>
-                  </p:tgtEl>
-                </p:cond>
-              </p:prevCondLst>
-              <p:nextCondLst>
-                <p:cond evt="onNext" delay="0">
-                  <p:tgtEl>
-                    <p:sldTgt/>
-                  </p:tgtEl>
-                </p:cond>
-              </p:nextCondLst>
-            </p:seq>
-          </p:childTnLst>
-        </p:cTn>
-      </p:par>
-    </p:tnLst>
-  </p:timing>
-</p:sld>
-</file>
-
-<file path=ppt/slides/slide9.xml><?xml version="1.0" encoding="utf-8"?>
-<p:sld xmlns:a="http://schemas.openxmlformats.org/drawingml/2006/main" xmlns:r="http://schemas.openxmlformats.org/officeDocument/2006/relationships" xmlns:p="http://schemas.openxmlformats.org/presentationml/2006/main">
-  <p:cSld>
-    <p:spTree>
-      <p:nvGrpSpPr>
-        <p:cNvPr id="1" name=""/>
-        <p:cNvGrpSpPr/>
-        <p:nvPr/>
-      </p:nvGrpSpPr>
-      <p:grpSpPr>
-        <a:xfrm>
-          <a:off x="0" y="0"/>
-          <a:ext cx="0" cy="0"/>
-          <a:chOff x="0" y="0"/>
-          <a:chExt cx="0" cy="0"/>
-        </a:xfrm>
-      </p:grpSpPr>
-      <p:sp>
-        <p:nvSpPr>
-          <p:cNvPr id="3" name="Content Placeholder 2">
-            <a:extLst>
-              <a:ext uri="{FF2B5EF4-FFF2-40B4-BE49-F238E27FC236}">
-                <a16:creationId xmlns:a16="http://schemas.microsoft.com/office/drawing/2014/main" id="{E093EA72-03C6-495B-9DED-F8BC9DB4D934}"/>
-              </a:ext>
-            </a:extLst>
-          </p:cNvPr>
-          <p:cNvSpPr>
-            <a:spLocks noGrp="1"/>
-          </p:cNvSpPr>
-          <p:nvPr>
-            <p:ph sz="quarter" idx="10"/>
-          </p:nvPr>
-        </p:nvSpPr>
-        <p:spPr/>
-        <p:txBody>
-          <a:bodyPr/>
-          <a:lstStyle/>
-          <a:p>
-            <a:r>
-              <a:rPr lang="en-US" dirty="0"/>
-              <a:t>Transmission gates</a:t>
-            </a:r>
-          </a:p>
-        </p:txBody>
-      </p:sp>
-      <p:pic>
-        <p:nvPicPr>
-          <p:cNvPr id="4" name="Picture 2">
-            <a:extLst>
-              <a:ext uri="{FF2B5EF4-FFF2-40B4-BE49-F238E27FC236}">
-                <a16:creationId xmlns:a16="http://schemas.microsoft.com/office/drawing/2014/main" id="{CE3C1035-5EAC-4AA6-9CBD-1328DA5821D6}"/>
-              </a:ext>
-            </a:extLst>
-          </p:cNvPr>
-          <p:cNvPicPr>
-            <a:picLocks noGrp="1" noChangeAspect="1" noChangeArrowheads="1"/>
-          </p:cNvPicPr>
-          <p:nvPr>
-            <p:ph idx="1"/>
-          </p:nvPr>
-        </p:nvPicPr>
-        <p:blipFill rotWithShape="1">
-          <a:blip r:embed="rId2">
-            <a:extLst>
-              <a:ext uri="{28A0092B-C50C-407E-A947-70E740481C1C}">
-                <a14:useLocalDpi xmlns:a14="http://schemas.microsoft.com/office/drawing/2010/main" val="0"/>
-              </a:ext>
-            </a:extLst>
-          </a:blip>
-          <a:srcRect b="8418"/>
-          <a:stretch/>
-        </p:blipFill>
-        <p:spPr bwMode="auto">
-          <a:xfrm>
-            <a:off x="90142" y="1371600"/>
-            <a:ext cx="6918671" cy="5099813"/>
-          </a:xfrm>
-          <a:prstGeom prst="rect">
-            <a:avLst/>
-          </a:prstGeom>
-          <a:noFill/>
-          <a:extLst>
-            <a:ext uri="{909E8E84-426E-40DD-AFC4-6F175D3DCCD1}">
-              <a14:hiddenFill xmlns:a14="http://schemas.microsoft.com/office/drawing/2010/main">
-                <a:solidFill>
-                  <a:srgbClr val="FFFFFF"/>
-                </a:solidFill>
-              </a14:hiddenFill>
-            </a:ext>
-          </a:extLst>
-        </p:spPr>
-      </p:pic>
-      <p:pic>
-        <p:nvPicPr>
-          <p:cNvPr id="5" name="Picture 2">
-            <a:extLst>
-              <a:ext uri="{FF2B5EF4-FFF2-40B4-BE49-F238E27FC236}">
-                <a16:creationId xmlns:a16="http://schemas.microsoft.com/office/drawing/2014/main" id="{C9EC30F2-6FD5-41B1-95BF-FFEB1AF35A47}"/>
-              </a:ext>
-            </a:extLst>
-          </p:cNvPr>
-          <p:cNvPicPr>
-            <a:picLocks noChangeAspect="1" noChangeArrowheads="1"/>
-          </p:cNvPicPr>
-          <p:nvPr/>
-        </p:nvPicPr>
-        <p:blipFill>
-          <a:blip r:embed="rId3">
-            <a:extLst>
-              <a:ext uri="{28A0092B-C50C-407E-A947-70E740481C1C}">
-                <a14:useLocalDpi xmlns:a14="http://schemas.microsoft.com/office/drawing/2010/main" val="0"/>
-              </a:ext>
-            </a:extLst>
-          </a:blip>
-          <a:srcRect/>
-          <a:stretch>
-            <a:fillRect/>
-          </a:stretch>
-        </p:blipFill>
-        <p:spPr bwMode="auto">
-          <a:xfrm>
-            <a:off x="6274545" y="4583906"/>
-            <a:ext cx="2798363" cy="1804988"/>
-          </a:xfrm>
-          <a:prstGeom prst="rect">
-            <a:avLst/>
-          </a:prstGeom>
-          <a:noFill/>
-          <a:extLst>
-            <a:ext uri="{909E8E84-426E-40DD-AFC4-6F175D3DCCD1}">
-              <a14:hiddenFill xmlns:a14="http://schemas.microsoft.com/office/drawing/2010/main">
-                <a:solidFill>
-                  <a:srgbClr val="FFFFFF"/>
-                </a:solidFill>
-              </a14:hiddenFill>
-            </a:ext>
-          </a:extLst>
-        </p:spPr>
-      </p:pic>
-    </p:spTree>
-    <p:extLst>
-      <p:ext uri="{BB962C8B-B14F-4D97-AF65-F5344CB8AC3E}">
-        <p14:creationId xmlns:p14="http://schemas.microsoft.com/office/powerpoint/2010/main" val="260457647"/>
-      </p:ext>
-    </p:extLst>
-  </p:cSld>
-  <p:clrMapOvr>
-    <a:masterClrMapping/>
-  </p:clrMapOvr>
-  <p:timing>
-    <p:tnLst>
-      <p:par>
-        <p:cTn id="1" dur="indefinite" restart="never" nodeType="tmRoot">
-          <p:childTnLst>
-            <p:seq concurrent="1" nextAc="seek">
-              <p:cTn id="2" dur="indefinite" nodeType="mainSeq">
-                <p:childTnLst>
-                  <p:par>
-                    <p:cTn id="3" fill="hold">
-                      <p:stCondLst>
-                        <p:cond delay="indefinite"/>
-                      </p:stCondLst>
-                      <p:childTnLst>
-                        <p:par>
-                          <p:cTn id="4" fill="hold">
-                            <p:stCondLst>
-                              <p:cond delay="0"/>
-                            </p:stCondLst>
-                            <p:childTnLst>
-                              <p:par>
-                                <p:cTn id="5" presetID="1" presetClass="entr" presetSubtype="0" fill="hold" nodeType="clickEffect">
-                                  <p:stCondLst>
-                                    <p:cond delay="0"/>
-                                  </p:stCondLst>
-                                  <p:childTnLst>
-                                    <p:set>
-                                      <p:cBhvr>
-                                        <p:cTn id="6" dur="1" fill="hold">
-                                          <p:stCondLst>
-                                            <p:cond delay="0"/>
-                                          </p:stCondLst>
-                                        </p:cTn>
-                                        <p:tgtEl>
-                                          <p:spTgt spid="5"/>
                                         </p:tgtEl>
                                         <p:attrNameLst>
                                           <p:attrName>style.visibility</p:attrName>

</xml_diff>